<commit_message>
Add scripts, but have to be reduced
</commit_message>
<xml_diff>
--- a/Team Project/Presentation/Presentation - Team 1.pptx
+++ b/Team Project/Presentation/Presentation - Team 1.pptx
@@ -482,6 +482,1035 @@
     </a:lvl9pPr>
   </p:notesStyle>
 </p:notesMaster>
+</file>
+
+<file path=ppt/notesSlides/notesSlide1.xml><?xml version="1.0" encoding="utf-8"?>
+<p:notes xmlns:a="http://schemas.openxmlformats.org/drawingml/2006/main" xmlns:r="http://schemas.openxmlformats.org/officeDocument/2006/relationships" xmlns:p="http://schemas.openxmlformats.org/presentationml/2006/main">
+  <p:cSld>
+    <p:spTree>
+      <p:nvGrpSpPr>
+        <p:cNvPr id="1" name=""/>
+        <p:cNvGrpSpPr/>
+        <p:nvPr/>
+      </p:nvGrpSpPr>
+      <p:grpSpPr>
+        <a:xfrm>
+          <a:off x="0" y="0"/>
+          <a:ext cx="0" cy="0"/>
+          <a:chOff x="0" y="0"/>
+          <a:chExt cx="0" cy="0"/>
+        </a:xfrm>
+      </p:grpSpPr>
+      <p:sp>
+        <p:nvSpPr>
+          <p:cNvPr id="2" name="슬라이드 이미지 개체 틀 1"/>
+          <p:cNvSpPr>
+            <a:spLocks noGrp="1" noRot="1" noChangeAspect="1"/>
+          </p:cNvSpPr>
+          <p:nvPr>
+            <p:ph type="sldImg"/>
+          </p:nvPr>
+        </p:nvSpPr>
+        <p:spPr/>
+      </p:sp>
+      <p:sp>
+        <p:nvSpPr>
+          <p:cNvPr id="3" name="슬라이드 노트 개체 틀 2"/>
+          <p:cNvSpPr>
+            <a:spLocks noGrp="1"/>
+          </p:cNvSpPr>
+          <p:nvPr>
+            <p:ph type="body" idx="1"/>
+          </p:nvPr>
+        </p:nvSpPr>
+        <p:spPr/>
+        <p:txBody>
+          <a:bodyPr/>
+          <a:lstStyle/>
+          <a:p>
+            <a:r>
+              <a:rPr lang="en-US" altLang="ko-KR" dirty="0" smtClean="0"/>
+              <a:t>Hello.</a:t>
+            </a:r>
+            <a:r>
+              <a:rPr lang="en-US" altLang="ko-KR" baseline="0" dirty="0" smtClean="0"/>
+              <a:t> We are Team 1. We will </a:t>
+            </a:r>
+            <a:r>
+              <a:rPr lang="en-US" altLang="ko-KR" baseline="0" dirty="0" err="1" smtClean="0"/>
+              <a:t>introduct</a:t>
+            </a:r>
+            <a:r>
+              <a:rPr lang="en-US" altLang="ko-KR" baseline="0" dirty="0" smtClean="0"/>
+              <a:t> a sentence selection </a:t>
+            </a:r>
+            <a:r>
+              <a:rPr lang="en-US" altLang="ko-KR" baseline="0" dirty="0" err="1" smtClean="0"/>
+              <a:t>chatbot</a:t>
+            </a:r>
+            <a:r>
+              <a:rPr lang="en-US" altLang="ko-KR" baseline="0" dirty="0" smtClean="0"/>
+              <a:t> for Ubuntu dialog corpus.</a:t>
+            </a:r>
+            <a:endParaRPr lang="ko-KR" altLang="en-US" dirty="0"/>
+          </a:p>
+        </p:txBody>
+      </p:sp>
+      <p:sp>
+        <p:nvSpPr>
+          <p:cNvPr id="4" name="슬라이드 번호 개체 틀 3"/>
+          <p:cNvSpPr>
+            <a:spLocks noGrp="1"/>
+          </p:cNvSpPr>
+          <p:nvPr>
+            <p:ph type="sldNum" sz="quarter" idx="10"/>
+          </p:nvPr>
+        </p:nvSpPr>
+        <p:spPr/>
+        <p:txBody>
+          <a:bodyPr/>
+          <a:lstStyle/>
+          <a:p>
+            <a:fld id="{7371CE20-0D15-42EA-85C0-6563A297F5E2}" type="slidenum">
+              <a:rPr lang="ko-KR" altLang="en-US" smtClean="0"/>
+              <a:t>1</a:t>
+            </a:fld>
+            <a:endParaRPr lang="ko-KR" altLang="en-US"/>
+          </a:p>
+        </p:txBody>
+      </p:sp>
+    </p:spTree>
+    <p:extLst>
+      <p:ext uri="{BB962C8B-B14F-4D97-AF65-F5344CB8AC3E}">
+        <p14:creationId xmlns:p14="http://schemas.microsoft.com/office/powerpoint/2010/main" val="61851743"/>
+      </p:ext>
+    </p:extLst>
+  </p:cSld>
+  <p:clrMapOvr>
+    <a:masterClrMapping/>
+  </p:clrMapOvr>
+</p:notes>
+</file>
+
+<file path=ppt/notesSlides/notesSlide2.xml><?xml version="1.0" encoding="utf-8"?>
+<p:notes xmlns:a="http://schemas.openxmlformats.org/drawingml/2006/main" xmlns:r="http://schemas.openxmlformats.org/officeDocument/2006/relationships" xmlns:p="http://schemas.openxmlformats.org/presentationml/2006/main">
+  <p:cSld>
+    <p:spTree>
+      <p:nvGrpSpPr>
+        <p:cNvPr id="1" name=""/>
+        <p:cNvGrpSpPr/>
+        <p:nvPr/>
+      </p:nvGrpSpPr>
+      <p:grpSpPr>
+        <a:xfrm>
+          <a:off x="0" y="0"/>
+          <a:ext cx="0" cy="0"/>
+          <a:chOff x="0" y="0"/>
+          <a:chExt cx="0" cy="0"/>
+        </a:xfrm>
+      </p:grpSpPr>
+      <p:sp>
+        <p:nvSpPr>
+          <p:cNvPr id="2" name="슬라이드 이미지 개체 틀 1"/>
+          <p:cNvSpPr>
+            <a:spLocks noGrp="1" noRot="1" noChangeAspect="1"/>
+          </p:cNvSpPr>
+          <p:nvPr>
+            <p:ph type="sldImg"/>
+          </p:nvPr>
+        </p:nvSpPr>
+        <p:spPr/>
+      </p:sp>
+      <p:sp>
+        <p:nvSpPr>
+          <p:cNvPr id="3" name="슬라이드 노트 개체 틀 2"/>
+          <p:cNvSpPr>
+            <a:spLocks noGrp="1"/>
+          </p:cNvSpPr>
+          <p:nvPr>
+            <p:ph type="body" idx="1"/>
+          </p:nvPr>
+        </p:nvSpPr>
+        <p:spPr/>
+        <p:txBody>
+          <a:bodyPr/>
+          <a:lstStyle/>
+          <a:p>
+            <a:r>
+              <a:rPr lang="en-US" altLang="ko-KR" dirty="0" smtClean="0"/>
+              <a:t>Here is the table of contents.</a:t>
+            </a:r>
+          </a:p>
+        </p:txBody>
+      </p:sp>
+      <p:sp>
+        <p:nvSpPr>
+          <p:cNvPr id="4" name="슬라이드 번호 개체 틀 3"/>
+          <p:cNvSpPr>
+            <a:spLocks noGrp="1"/>
+          </p:cNvSpPr>
+          <p:nvPr>
+            <p:ph type="sldNum" sz="quarter" idx="10"/>
+          </p:nvPr>
+        </p:nvSpPr>
+        <p:spPr/>
+        <p:txBody>
+          <a:bodyPr/>
+          <a:lstStyle/>
+          <a:p>
+            <a:fld id="{7371CE20-0D15-42EA-85C0-6563A297F5E2}" type="slidenum">
+              <a:rPr lang="ko-KR" altLang="en-US" smtClean="0"/>
+              <a:t>2</a:t>
+            </a:fld>
+            <a:endParaRPr lang="ko-KR" altLang="en-US"/>
+          </a:p>
+        </p:txBody>
+      </p:sp>
+    </p:spTree>
+    <p:extLst>
+      <p:ext uri="{BB962C8B-B14F-4D97-AF65-F5344CB8AC3E}">
+        <p14:creationId xmlns:p14="http://schemas.microsoft.com/office/powerpoint/2010/main" val="407856838"/>
+      </p:ext>
+    </p:extLst>
+  </p:cSld>
+  <p:clrMapOvr>
+    <a:masterClrMapping/>
+  </p:clrMapOvr>
+</p:notes>
+</file>
+
+<file path=ppt/notesSlides/notesSlide3.xml><?xml version="1.0" encoding="utf-8"?>
+<p:notes xmlns:a="http://schemas.openxmlformats.org/drawingml/2006/main" xmlns:r="http://schemas.openxmlformats.org/officeDocument/2006/relationships" xmlns:p="http://schemas.openxmlformats.org/presentationml/2006/main">
+  <p:cSld>
+    <p:spTree>
+      <p:nvGrpSpPr>
+        <p:cNvPr id="1" name=""/>
+        <p:cNvGrpSpPr/>
+        <p:nvPr/>
+      </p:nvGrpSpPr>
+      <p:grpSpPr>
+        <a:xfrm>
+          <a:off x="0" y="0"/>
+          <a:ext cx="0" cy="0"/>
+          <a:chOff x="0" y="0"/>
+          <a:chExt cx="0" cy="0"/>
+        </a:xfrm>
+      </p:grpSpPr>
+      <p:sp>
+        <p:nvSpPr>
+          <p:cNvPr id="2" name="슬라이드 이미지 개체 틀 1"/>
+          <p:cNvSpPr>
+            <a:spLocks noGrp="1" noRot="1" noChangeAspect="1"/>
+          </p:cNvSpPr>
+          <p:nvPr>
+            <p:ph type="sldImg"/>
+          </p:nvPr>
+        </p:nvSpPr>
+        <p:spPr/>
+      </p:sp>
+      <p:sp>
+        <p:nvSpPr>
+          <p:cNvPr id="3" name="슬라이드 노트 개체 틀 2"/>
+          <p:cNvSpPr>
+            <a:spLocks noGrp="1"/>
+          </p:cNvSpPr>
+          <p:nvPr>
+            <p:ph type="body" idx="1"/>
+          </p:nvPr>
+        </p:nvSpPr>
+        <p:spPr/>
+        <p:txBody>
+          <a:bodyPr/>
+          <a:lstStyle/>
+          <a:p>
+            <a:r>
+              <a:rPr lang="en-US" altLang="ko-KR" dirty="0" smtClean="0"/>
+              <a:t>M</a:t>
+            </a:r>
+            <a:r>
+              <a:rPr lang="en-US" altLang="ko-KR" baseline="0" dirty="0" smtClean="0"/>
+              <a:t>achine learning developed many breakthrough results like classifying images, object detection, and so on. </a:t>
+            </a:r>
+          </a:p>
+          <a:p>
+            <a:r>
+              <a:rPr lang="en-US" altLang="ko-KR" baseline="0" dirty="0" smtClean="0"/>
+              <a:t>Additionally, recent researches and products have introduced AI which recognizes the context of the situation. </a:t>
+            </a:r>
+          </a:p>
+          <a:p>
+            <a:r>
+              <a:rPr lang="en-US" altLang="ko-KR" baseline="0" dirty="0" smtClean="0"/>
+              <a:t>For the sense of the intelligent mechanics, robots have to interact with humans properly, so they have to understand what is need for humans. </a:t>
+            </a:r>
+          </a:p>
+          <a:p>
+            <a:r>
+              <a:rPr lang="en-US" altLang="ko-KR" baseline="0" dirty="0" smtClean="0"/>
+              <a:t>As a user-friendly product, many companies launched their </a:t>
+            </a:r>
+            <a:r>
+              <a:rPr lang="en-US" altLang="ko-KR" baseline="0" dirty="0" err="1" smtClean="0"/>
+              <a:t>chatbots</a:t>
+            </a:r>
+            <a:r>
+              <a:rPr lang="en-US" altLang="ko-KR" baseline="0" dirty="0" smtClean="0"/>
+              <a:t> to solve customers requests. </a:t>
+            </a:r>
+          </a:p>
+          <a:p>
+            <a:r>
+              <a:rPr lang="en-US" altLang="ko-KR" baseline="0" dirty="0" smtClean="0"/>
+              <a:t>Google launched google assistant for their android phones. </a:t>
+            </a:r>
+          </a:p>
+          <a:p>
+            <a:r>
+              <a:rPr lang="en-US" altLang="ko-KR" baseline="0" dirty="0" smtClean="0"/>
+              <a:t>Banks of Korea also introduced their own clerks and encourage users to get the answer by text.</a:t>
+            </a:r>
+          </a:p>
+          <a:p>
+            <a:endParaRPr lang="ko-KR" altLang="en-US" dirty="0"/>
+          </a:p>
+        </p:txBody>
+      </p:sp>
+      <p:sp>
+        <p:nvSpPr>
+          <p:cNvPr id="4" name="슬라이드 번호 개체 틀 3"/>
+          <p:cNvSpPr>
+            <a:spLocks noGrp="1"/>
+          </p:cNvSpPr>
+          <p:nvPr>
+            <p:ph type="sldNum" sz="quarter" idx="10"/>
+          </p:nvPr>
+        </p:nvSpPr>
+        <p:spPr/>
+        <p:txBody>
+          <a:bodyPr/>
+          <a:lstStyle/>
+          <a:p>
+            <a:fld id="{7371CE20-0D15-42EA-85C0-6563A297F5E2}" type="slidenum">
+              <a:rPr lang="ko-KR" altLang="en-US" smtClean="0"/>
+              <a:t>3</a:t>
+            </a:fld>
+            <a:endParaRPr lang="ko-KR" altLang="en-US"/>
+          </a:p>
+        </p:txBody>
+      </p:sp>
+    </p:spTree>
+    <p:extLst>
+      <p:ext uri="{BB962C8B-B14F-4D97-AF65-F5344CB8AC3E}">
+        <p14:creationId xmlns:p14="http://schemas.microsoft.com/office/powerpoint/2010/main" val="3421107077"/>
+      </p:ext>
+    </p:extLst>
+  </p:cSld>
+  <p:clrMapOvr>
+    <a:masterClrMapping/>
+  </p:clrMapOvr>
+</p:notes>
+</file>
+
+<file path=ppt/notesSlides/notesSlide4.xml><?xml version="1.0" encoding="utf-8"?>
+<p:notes xmlns:a="http://schemas.openxmlformats.org/drawingml/2006/main" xmlns:r="http://schemas.openxmlformats.org/officeDocument/2006/relationships" xmlns:p="http://schemas.openxmlformats.org/presentationml/2006/main">
+  <p:cSld>
+    <p:spTree>
+      <p:nvGrpSpPr>
+        <p:cNvPr id="1" name=""/>
+        <p:cNvGrpSpPr/>
+        <p:nvPr/>
+      </p:nvGrpSpPr>
+      <p:grpSpPr>
+        <a:xfrm>
+          <a:off x="0" y="0"/>
+          <a:ext cx="0" cy="0"/>
+          <a:chOff x="0" y="0"/>
+          <a:chExt cx="0" cy="0"/>
+        </a:xfrm>
+      </p:grpSpPr>
+      <p:sp>
+        <p:nvSpPr>
+          <p:cNvPr id="2" name="슬라이드 이미지 개체 틀 1"/>
+          <p:cNvSpPr>
+            <a:spLocks noGrp="1" noRot="1" noChangeAspect="1"/>
+          </p:cNvSpPr>
+          <p:nvPr>
+            <p:ph type="sldImg"/>
+          </p:nvPr>
+        </p:nvSpPr>
+        <p:spPr/>
+      </p:sp>
+      <p:sp>
+        <p:nvSpPr>
+          <p:cNvPr id="3" name="슬라이드 노트 개체 틀 2"/>
+          <p:cNvSpPr>
+            <a:spLocks noGrp="1"/>
+          </p:cNvSpPr>
+          <p:nvPr>
+            <p:ph type="body" idx="1"/>
+          </p:nvPr>
+        </p:nvSpPr>
+        <p:spPr/>
+        <p:txBody>
+          <a:bodyPr/>
+          <a:lstStyle/>
+          <a:p>
+            <a:r>
+              <a:rPr lang="en-US" altLang="ko-KR" dirty="0" smtClean="0"/>
+              <a:t>There are some properties</a:t>
+            </a:r>
+            <a:r>
+              <a:rPr lang="en-US" altLang="ko-KR" baseline="0" dirty="0" smtClean="0"/>
+              <a:t> for </a:t>
+            </a:r>
+            <a:r>
+              <a:rPr lang="en-US" altLang="ko-KR" baseline="0" dirty="0" err="1" smtClean="0"/>
+              <a:t>chatbots</a:t>
+            </a:r>
+            <a:r>
+              <a:rPr lang="en-US" altLang="ko-KR" baseline="0" dirty="0" smtClean="0"/>
+              <a:t>. For instance they have to answer similarly for inputs having similar meaning. Even if we enter exchange rate of 100 dollars rather than the exchange of 100 dollars on the bank clerk, we want to get the amount of Korean won corresponding to 100 dollar. Sometimes, we may enter a not-completed sentences, typos, or even abbreviations for the </a:t>
+            </a:r>
+            <a:r>
+              <a:rPr lang="en-US" altLang="ko-KR" baseline="0" dirty="0" err="1" smtClean="0"/>
+              <a:t>chatbot</a:t>
+            </a:r>
+            <a:r>
+              <a:rPr lang="en-US" altLang="ko-KR" baseline="0" dirty="0" smtClean="0"/>
+              <a:t>. If </a:t>
+            </a:r>
+            <a:r>
+              <a:rPr lang="en-US" altLang="ko-KR" baseline="0" dirty="0" err="1" smtClean="0"/>
+              <a:t>chatbot</a:t>
+            </a:r>
+            <a:r>
+              <a:rPr lang="en-US" altLang="ko-KR" baseline="0" dirty="0" smtClean="0"/>
+              <a:t> can understand what it means, then it can still answer. But, many </a:t>
+            </a:r>
+            <a:r>
+              <a:rPr lang="en-US" altLang="ko-KR" baseline="0" dirty="0" err="1" smtClean="0"/>
+              <a:t>chatbots</a:t>
+            </a:r>
+            <a:r>
+              <a:rPr lang="en-US" altLang="ko-KR" baseline="0" dirty="0" smtClean="0"/>
+              <a:t> cannot do that. I entered 100 dollar</a:t>
+            </a:r>
+            <a:r>
+              <a:rPr lang="ko-KR" altLang="en-US" baseline="0" dirty="0" smtClean="0"/>
+              <a:t> </a:t>
+            </a:r>
+            <a:r>
+              <a:rPr lang="en-US" altLang="ko-KR" baseline="0" dirty="0" smtClean="0"/>
+              <a:t>exchange</a:t>
+            </a:r>
+            <a:r>
+              <a:rPr lang="ko-KR" altLang="en-US" baseline="0" dirty="0" smtClean="0"/>
+              <a:t> </a:t>
+            </a:r>
+            <a:r>
+              <a:rPr lang="en-US" altLang="ko-KR" baseline="0" dirty="0" smtClean="0"/>
+              <a:t>on</a:t>
+            </a:r>
+            <a:r>
+              <a:rPr lang="ko-KR" altLang="en-US" baseline="0" dirty="0" smtClean="0"/>
+              <a:t> </a:t>
+            </a:r>
+            <a:r>
+              <a:rPr lang="en-US" altLang="ko-KR" baseline="0" dirty="0" smtClean="0"/>
+              <a:t>the bank clerk, and it returned the proper result. After that, when I entered 100 dollar exchange rate, it suddenly didn’t understand.</a:t>
+            </a:r>
+            <a:endParaRPr lang="ko-KR" altLang="en-US" dirty="0"/>
+          </a:p>
+        </p:txBody>
+      </p:sp>
+      <p:sp>
+        <p:nvSpPr>
+          <p:cNvPr id="4" name="슬라이드 번호 개체 틀 3"/>
+          <p:cNvSpPr>
+            <a:spLocks noGrp="1"/>
+          </p:cNvSpPr>
+          <p:nvPr>
+            <p:ph type="sldNum" sz="quarter" idx="10"/>
+          </p:nvPr>
+        </p:nvSpPr>
+        <p:spPr/>
+        <p:txBody>
+          <a:bodyPr/>
+          <a:lstStyle/>
+          <a:p>
+            <a:fld id="{7371CE20-0D15-42EA-85C0-6563A297F5E2}" type="slidenum">
+              <a:rPr lang="ko-KR" altLang="en-US" smtClean="0"/>
+              <a:t>4</a:t>
+            </a:fld>
+            <a:endParaRPr lang="ko-KR" altLang="en-US"/>
+          </a:p>
+        </p:txBody>
+      </p:sp>
+    </p:spTree>
+    <p:extLst>
+      <p:ext uri="{BB962C8B-B14F-4D97-AF65-F5344CB8AC3E}">
+        <p14:creationId xmlns:p14="http://schemas.microsoft.com/office/powerpoint/2010/main" val="2816653419"/>
+      </p:ext>
+    </p:extLst>
+  </p:cSld>
+  <p:clrMapOvr>
+    <a:masterClrMapping/>
+  </p:clrMapOvr>
+</p:notes>
+</file>
+
+<file path=ppt/notesSlides/notesSlide5.xml><?xml version="1.0" encoding="utf-8"?>
+<p:notes xmlns:a="http://schemas.openxmlformats.org/drawingml/2006/main" xmlns:r="http://schemas.openxmlformats.org/officeDocument/2006/relationships" xmlns:p="http://schemas.openxmlformats.org/presentationml/2006/main">
+  <p:cSld>
+    <p:spTree>
+      <p:nvGrpSpPr>
+        <p:cNvPr id="1" name=""/>
+        <p:cNvGrpSpPr/>
+        <p:nvPr/>
+      </p:nvGrpSpPr>
+      <p:grpSpPr>
+        <a:xfrm>
+          <a:off x="0" y="0"/>
+          <a:ext cx="0" cy="0"/>
+          <a:chOff x="0" y="0"/>
+          <a:chExt cx="0" cy="0"/>
+        </a:xfrm>
+      </p:grpSpPr>
+      <p:sp>
+        <p:nvSpPr>
+          <p:cNvPr id="2" name="슬라이드 이미지 개체 틀 1"/>
+          <p:cNvSpPr>
+            <a:spLocks noGrp="1" noRot="1" noChangeAspect="1"/>
+          </p:cNvSpPr>
+          <p:nvPr>
+            <p:ph type="sldImg"/>
+          </p:nvPr>
+        </p:nvSpPr>
+        <p:spPr/>
+      </p:sp>
+      <p:sp>
+        <p:nvSpPr>
+          <p:cNvPr id="3" name="슬라이드 노트 개체 틀 2"/>
+          <p:cNvSpPr>
+            <a:spLocks noGrp="1"/>
+          </p:cNvSpPr>
+          <p:nvPr>
+            <p:ph type="body" idx="1"/>
+          </p:nvPr>
+        </p:nvSpPr>
+        <p:spPr/>
+        <p:txBody>
+          <a:bodyPr/>
+          <a:lstStyle/>
+          <a:p>
+            <a:r>
+              <a:rPr lang="en-US" altLang="ko-KR" dirty="0" smtClean="0"/>
+              <a:t>As</a:t>
+            </a:r>
+            <a:r>
+              <a:rPr lang="en-US" altLang="ko-KR" baseline="0" dirty="0" smtClean="0"/>
+              <a:t> the matter of context, we sometimes omit some parts of the sentence when we talk to each other. So I entered US dollar exchange, and then entered what about china. Then the bank clerk just forgot the context of the dialog and suggested some alternatives. This clerk also failed to recognize similar usage. After I entered dollar exchange rate, I entered 100 dollar exchange rate. Then the clerk said, follow the form of the input to exchange. It is just a rule-based answer, so it means that this </a:t>
+            </a:r>
+            <a:r>
+              <a:rPr lang="en-US" altLang="ko-KR" baseline="0" dirty="0" err="1" smtClean="0"/>
+              <a:t>chatbot</a:t>
+            </a:r>
+            <a:r>
+              <a:rPr lang="en-US" altLang="ko-KR" baseline="0" dirty="0" smtClean="0"/>
+              <a:t> cannot recognize the similar usage.</a:t>
+            </a:r>
+            <a:endParaRPr lang="ko-KR" altLang="en-US" dirty="0"/>
+          </a:p>
+        </p:txBody>
+      </p:sp>
+      <p:sp>
+        <p:nvSpPr>
+          <p:cNvPr id="4" name="슬라이드 번호 개체 틀 3"/>
+          <p:cNvSpPr>
+            <a:spLocks noGrp="1"/>
+          </p:cNvSpPr>
+          <p:nvPr>
+            <p:ph type="sldNum" sz="quarter" idx="10"/>
+          </p:nvPr>
+        </p:nvSpPr>
+        <p:spPr/>
+        <p:txBody>
+          <a:bodyPr/>
+          <a:lstStyle/>
+          <a:p>
+            <a:fld id="{7371CE20-0D15-42EA-85C0-6563A297F5E2}" type="slidenum">
+              <a:rPr lang="ko-KR" altLang="en-US" smtClean="0"/>
+              <a:t>5</a:t>
+            </a:fld>
+            <a:endParaRPr lang="ko-KR" altLang="en-US"/>
+          </a:p>
+        </p:txBody>
+      </p:sp>
+    </p:spTree>
+    <p:extLst>
+      <p:ext uri="{BB962C8B-B14F-4D97-AF65-F5344CB8AC3E}">
+        <p14:creationId xmlns:p14="http://schemas.microsoft.com/office/powerpoint/2010/main" val="646394218"/>
+      </p:ext>
+    </p:extLst>
+  </p:cSld>
+  <p:clrMapOvr>
+    <a:masterClrMapping/>
+  </p:clrMapOvr>
+</p:notes>
+</file>
+
+<file path=ppt/notesSlides/notesSlide6.xml><?xml version="1.0" encoding="utf-8"?>
+<p:notes xmlns:a="http://schemas.openxmlformats.org/drawingml/2006/main" xmlns:r="http://schemas.openxmlformats.org/officeDocument/2006/relationships" xmlns:p="http://schemas.openxmlformats.org/presentationml/2006/main">
+  <p:cSld>
+    <p:spTree>
+      <p:nvGrpSpPr>
+        <p:cNvPr id="1" name=""/>
+        <p:cNvGrpSpPr/>
+        <p:nvPr/>
+      </p:nvGrpSpPr>
+      <p:grpSpPr>
+        <a:xfrm>
+          <a:off x="0" y="0"/>
+          <a:ext cx="0" cy="0"/>
+          <a:chOff x="0" y="0"/>
+          <a:chExt cx="0" cy="0"/>
+        </a:xfrm>
+      </p:grpSpPr>
+      <p:sp>
+        <p:nvSpPr>
+          <p:cNvPr id="2" name="슬라이드 이미지 개체 틀 1"/>
+          <p:cNvSpPr>
+            <a:spLocks noGrp="1" noRot="1" noChangeAspect="1"/>
+          </p:cNvSpPr>
+          <p:nvPr>
+            <p:ph type="sldImg"/>
+          </p:nvPr>
+        </p:nvSpPr>
+        <p:spPr/>
+      </p:sp>
+      <p:sp>
+        <p:nvSpPr>
+          <p:cNvPr id="3" name="슬라이드 노트 개체 틀 2"/>
+          <p:cNvSpPr>
+            <a:spLocks noGrp="1"/>
+          </p:cNvSpPr>
+          <p:nvPr>
+            <p:ph type="body" idx="1"/>
+          </p:nvPr>
+        </p:nvSpPr>
+        <p:spPr/>
+        <p:txBody>
+          <a:bodyPr/>
+          <a:lstStyle/>
+          <a:p>
+            <a:r>
+              <a:rPr lang="en-US" altLang="ko-KR" dirty="0" smtClean="0"/>
+              <a:t>Because of that, we decided to implement a </a:t>
+            </a:r>
+            <a:r>
+              <a:rPr lang="en-US" altLang="ko-KR" dirty="0" err="1" smtClean="0"/>
+              <a:t>chatbot</a:t>
+            </a:r>
+            <a:r>
+              <a:rPr lang="en-US" altLang="ko-KR" dirty="0" smtClean="0"/>
+              <a:t> which can take care about the</a:t>
+            </a:r>
+            <a:r>
+              <a:rPr lang="en-US" altLang="ko-KR" baseline="0" dirty="0" smtClean="0"/>
+              <a:t> two-person conversation with wrong grammar, typos, and even needless emoji. Additionally, we took care about expertized terminology from task-specific domain. What we want to do is let the </a:t>
+            </a:r>
+            <a:r>
+              <a:rPr lang="en-US" altLang="ko-KR" baseline="0" dirty="0" err="1" smtClean="0"/>
+              <a:t>chatbot</a:t>
+            </a:r>
+            <a:r>
+              <a:rPr lang="en-US" altLang="ko-KR" baseline="0" dirty="0" smtClean="0"/>
+              <a:t> selects the right reaction from the answer pool.</a:t>
+            </a:r>
+            <a:endParaRPr lang="ko-KR" altLang="en-US" dirty="0"/>
+          </a:p>
+        </p:txBody>
+      </p:sp>
+      <p:sp>
+        <p:nvSpPr>
+          <p:cNvPr id="4" name="슬라이드 번호 개체 틀 3"/>
+          <p:cNvSpPr>
+            <a:spLocks noGrp="1"/>
+          </p:cNvSpPr>
+          <p:nvPr>
+            <p:ph type="sldNum" sz="quarter" idx="10"/>
+          </p:nvPr>
+        </p:nvSpPr>
+        <p:spPr/>
+        <p:txBody>
+          <a:bodyPr/>
+          <a:lstStyle/>
+          <a:p>
+            <a:fld id="{7371CE20-0D15-42EA-85C0-6563A297F5E2}" type="slidenum">
+              <a:rPr lang="ko-KR" altLang="en-US" smtClean="0"/>
+              <a:t>6</a:t>
+            </a:fld>
+            <a:endParaRPr lang="ko-KR" altLang="en-US"/>
+          </a:p>
+        </p:txBody>
+      </p:sp>
+    </p:spTree>
+    <p:extLst>
+      <p:ext uri="{BB962C8B-B14F-4D97-AF65-F5344CB8AC3E}">
+        <p14:creationId xmlns:p14="http://schemas.microsoft.com/office/powerpoint/2010/main" val="3328820115"/>
+      </p:ext>
+    </p:extLst>
+  </p:cSld>
+  <p:clrMapOvr>
+    <a:masterClrMapping/>
+  </p:clrMapOvr>
+</p:notes>
+</file>
+
+<file path=ppt/notesSlides/notesSlide7.xml><?xml version="1.0" encoding="utf-8"?>
+<p:notes xmlns:a="http://schemas.openxmlformats.org/drawingml/2006/main" xmlns:r="http://schemas.openxmlformats.org/officeDocument/2006/relationships" xmlns:p="http://schemas.openxmlformats.org/presentationml/2006/main">
+  <p:cSld>
+    <p:spTree>
+      <p:nvGrpSpPr>
+        <p:cNvPr id="1" name=""/>
+        <p:cNvGrpSpPr/>
+        <p:nvPr/>
+      </p:nvGrpSpPr>
+      <p:grpSpPr>
+        <a:xfrm>
+          <a:off x="0" y="0"/>
+          <a:ext cx="0" cy="0"/>
+          <a:chOff x="0" y="0"/>
+          <a:chExt cx="0" cy="0"/>
+        </a:xfrm>
+      </p:grpSpPr>
+      <p:sp>
+        <p:nvSpPr>
+          <p:cNvPr id="2" name="슬라이드 이미지 개체 틀 1"/>
+          <p:cNvSpPr>
+            <a:spLocks noGrp="1" noRot="1" noChangeAspect="1"/>
+          </p:cNvSpPr>
+          <p:nvPr>
+            <p:ph type="sldImg"/>
+          </p:nvPr>
+        </p:nvSpPr>
+        <p:spPr/>
+      </p:sp>
+      <p:sp>
+        <p:nvSpPr>
+          <p:cNvPr id="3" name="슬라이드 노트 개체 틀 2"/>
+          <p:cNvSpPr>
+            <a:spLocks noGrp="1"/>
+          </p:cNvSpPr>
+          <p:nvPr>
+            <p:ph type="body" idx="1"/>
+          </p:nvPr>
+        </p:nvSpPr>
+        <p:spPr/>
+        <p:txBody>
+          <a:bodyPr/>
+          <a:lstStyle/>
+          <a:p>
+            <a:r>
+              <a:rPr lang="en-US" altLang="ko-KR" dirty="0" smtClean="0"/>
+              <a:t>For this purpose, we decided to use Ubuntu dialogue corpus. This dataset is the collection of logs from Ubuntu-related chat rooms. The goal of each</a:t>
+            </a:r>
+            <a:r>
+              <a:rPr lang="en-US" altLang="ko-KR" baseline="0" dirty="0" smtClean="0"/>
+              <a:t> data is to solve an Ubuntu user’s posted problem from the two-person dialogue.</a:t>
+            </a:r>
+          </a:p>
+          <a:p>
+            <a:r>
+              <a:rPr lang="en-US" altLang="ko-KR" baseline="0" dirty="0" smtClean="0"/>
+              <a:t>Here is the formal detail. The given task is to select the next utterance from given candidate set with one </a:t>
+            </a:r>
+            <a:r>
+              <a:rPr lang="en-US" altLang="ko-KR" baseline="0" dirty="0" err="1" smtClean="0"/>
+              <a:t>hundered</a:t>
+            </a:r>
+            <a:r>
+              <a:rPr lang="en-US" altLang="ko-KR" baseline="0" dirty="0" smtClean="0"/>
+              <a:t> of sentences, where the only one of them is the correct answer. The performance of the </a:t>
+            </a:r>
+            <a:r>
+              <a:rPr lang="en-US" altLang="ko-KR" baseline="0" dirty="0" err="1" smtClean="0"/>
+              <a:t>chatbot</a:t>
+            </a:r>
+            <a:r>
+              <a:rPr lang="en-US" altLang="ko-KR" baseline="0" dirty="0" smtClean="0"/>
+              <a:t> will be decided by the accuracy of the results from Top n in 100. For instance, Top 1 accuracy measures the number of right </a:t>
+            </a:r>
+            <a:r>
+              <a:rPr lang="en-US" altLang="ko-KR" baseline="0" dirty="0" err="1" smtClean="0"/>
+              <a:t>responces</a:t>
+            </a:r>
+            <a:r>
+              <a:rPr lang="en-US" altLang="ko-KR" baseline="0" dirty="0" smtClean="0"/>
+              <a:t> among the whole responses.</a:t>
+            </a:r>
+            <a:endParaRPr lang="ko-KR" altLang="en-US" dirty="0"/>
+          </a:p>
+        </p:txBody>
+      </p:sp>
+      <p:sp>
+        <p:nvSpPr>
+          <p:cNvPr id="4" name="슬라이드 번호 개체 틀 3"/>
+          <p:cNvSpPr>
+            <a:spLocks noGrp="1"/>
+          </p:cNvSpPr>
+          <p:nvPr>
+            <p:ph type="sldNum" sz="quarter" idx="10"/>
+          </p:nvPr>
+        </p:nvSpPr>
+        <p:spPr/>
+        <p:txBody>
+          <a:bodyPr/>
+          <a:lstStyle/>
+          <a:p>
+            <a:fld id="{7371CE20-0D15-42EA-85C0-6563A297F5E2}" type="slidenum">
+              <a:rPr lang="ko-KR" altLang="en-US" smtClean="0"/>
+              <a:t>7</a:t>
+            </a:fld>
+            <a:endParaRPr lang="ko-KR" altLang="en-US"/>
+          </a:p>
+        </p:txBody>
+      </p:sp>
+    </p:spTree>
+    <p:extLst>
+      <p:ext uri="{BB962C8B-B14F-4D97-AF65-F5344CB8AC3E}">
+        <p14:creationId xmlns:p14="http://schemas.microsoft.com/office/powerpoint/2010/main" val="2758125808"/>
+      </p:ext>
+    </p:extLst>
+  </p:cSld>
+  <p:clrMapOvr>
+    <a:masterClrMapping/>
+  </p:clrMapOvr>
+</p:notes>
+</file>
+
+<file path=ppt/notesSlides/notesSlide8.xml><?xml version="1.0" encoding="utf-8"?>
+<p:notes xmlns:a="http://schemas.openxmlformats.org/drawingml/2006/main" xmlns:r="http://schemas.openxmlformats.org/officeDocument/2006/relationships" xmlns:p="http://schemas.openxmlformats.org/presentationml/2006/main">
+  <p:cSld>
+    <p:spTree>
+      <p:nvGrpSpPr>
+        <p:cNvPr id="1" name=""/>
+        <p:cNvGrpSpPr/>
+        <p:nvPr/>
+      </p:nvGrpSpPr>
+      <p:grpSpPr>
+        <a:xfrm>
+          <a:off x="0" y="0"/>
+          <a:ext cx="0" cy="0"/>
+          <a:chOff x="0" y="0"/>
+          <a:chExt cx="0" cy="0"/>
+        </a:xfrm>
+      </p:grpSpPr>
+      <p:sp>
+        <p:nvSpPr>
+          <p:cNvPr id="2" name="슬라이드 이미지 개체 틀 1"/>
+          <p:cNvSpPr>
+            <a:spLocks noGrp="1" noRot="1" noChangeAspect="1"/>
+          </p:cNvSpPr>
+          <p:nvPr>
+            <p:ph type="sldImg"/>
+          </p:nvPr>
+        </p:nvSpPr>
+        <p:spPr/>
+      </p:sp>
+      <p:sp>
+        <p:nvSpPr>
+          <p:cNvPr id="3" name="슬라이드 노트 개체 틀 2"/>
+          <p:cNvSpPr>
+            <a:spLocks noGrp="1"/>
+          </p:cNvSpPr>
+          <p:nvPr>
+            <p:ph type="body" idx="1"/>
+          </p:nvPr>
+        </p:nvSpPr>
+        <p:spPr/>
+        <p:txBody>
+          <a:bodyPr/>
+          <a:lstStyle/>
+          <a:p>
+            <a:r>
+              <a:rPr lang="en-US" altLang="ko-KR" dirty="0" smtClean="0"/>
+              <a:t>Here is an example of the data. In this dialogue, user 1 wants</a:t>
+            </a:r>
+            <a:r>
+              <a:rPr lang="en-US" altLang="ko-KR" baseline="0" dirty="0" smtClean="0"/>
+              <a:t> to recognize his </a:t>
+            </a:r>
+            <a:r>
+              <a:rPr lang="en-US" altLang="ko-KR" baseline="0" dirty="0" err="1" smtClean="0"/>
+              <a:t>ipod</a:t>
+            </a:r>
+            <a:r>
+              <a:rPr lang="en-US" altLang="ko-KR" baseline="0" dirty="0" smtClean="0"/>
+              <a:t> on the Ubuntu, but the tool called </a:t>
+            </a:r>
+            <a:r>
+              <a:rPr lang="en-US" altLang="ko-KR" baseline="0" dirty="0" err="1" smtClean="0"/>
+              <a:t>gtkpod</a:t>
+            </a:r>
+            <a:r>
+              <a:rPr lang="en-US" altLang="ko-KR" baseline="0" dirty="0" smtClean="0"/>
+              <a:t> doesn’t recognize it. So he asked that, and user2 suggested </a:t>
+            </a:r>
+            <a:r>
+              <a:rPr lang="en-US" altLang="ko-KR" baseline="0" dirty="0" err="1" smtClean="0"/>
+              <a:t>rhythmbox</a:t>
+            </a:r>
+            <a:r>
+              <a:rPr lang="en-US" altLang="ko-KR" baseline="0" dirty="0" smtClean="0"/>
+              <a:t> to read </a:t>
+            </a:r>
+            <a:r>
+              <a:rPr lang="en-US" altLang="ko-KR" baseline="0" dirty="0" err="1" smtClean="0"/>
+              <a:t>ipod</a:t>
+            </a:r>
+            <a:r>
+              <a:rPr lang="en-US" altLang="ko-KR" baseline="0" dirty="0" smtClean="0"/>
+              <a:t>. Then user1 asked about writing data into the </a:t>
+            </a:r>
+            <a:r>
+              <a:rPr lang="en-US" altLang="ko-KR" baseline="0" dirty="0" err="1" smtClean="0"/>
+              <a:t>ipod</a:t>
+            </a:r>
+            <a:r>
+              <a:rPr lang="en-US" altLang="ko-KR" baseline="0" dirty="0" smtClean="0"/>
+              <a:t>. In this example, the right answer is explaining what user2 experienced. There are some wrong examples, some of which contains simple answer like simple no, or some hesitating answer, and so on. Also you can see some typos and wrong grammars on the user 1.</a:t>
+            </a:r>
+            <a:endParaRPr lang="ko-KR" altLang="en-US" dirty="0"/>
+          </a:p>
+        </p:txBody>
+      </p:sp>
+      <p:sp>
+        <p:nvSpPr>
+          <p:cNvPr id="4" name="슬라이드 번호 개체 틀 3"/>
+          <p:cNvSpPr>
+            <a:spLocks noGrp="1"/>
+          </p:cNvSpPr>
+          <p:nvPr>
+            <p:ph type="sldNum" sz="quarter" idx="10"/>
+          </p:nvPr>
+        </p:nvSpPr>
+        <p:spPr/>
+        <p:txBody>
+          <a:bodyPr/>
+          <a:lstStyle/>
+          <a:p>
+            <a:fld id="{7371CE20-0D15-42EA-85C0-6563A297F5E2}" type="slidenum">
+              <a:rPr lang="ko-KR" altLang="en-US" smtClean="0"/>
+              <a:t>8</a:t>
+            </a:fld>
+            <a:endParaRPr lang="ko-KR" altLang="en-US"/>
+          </a:p>
+        </p:txBody>
+      </p:sp>
+    </p:spTree>
+    <p:extLst>
+      <p:ext uri="{BB962C8B-B14F-4D97-AF65-F5344CB8AC3E}">
+        <p14:creationId xmlns:p14="http://schemas.microsoft.com/office/powerpoint/2010/main" val="3703373112"/>
+      </p:ext>
+    </p:extLst>
+  </p:cSld>
+  <p:clrMapOvr>
+    <a:masterClrMapping/>
+  </p:clrMapOvr>
+</p:notes>
+</file>
+
+<file path=ppt/notesSlides/notesSlide9.xml><?xml version="1.0" encoding="utf-8"?>
+<p:notes xmlns:a="http://schemas.openxmlformats.org/drawingml/2006/main" xmlns:r="http://schemas.openxmlformats.org/officeDocument/2006/relationships" xmlns:p="http://schemas.openxmlformats.org/presentationml/2006/main">
+  <p:cSld>
+    <p:spTree>
+      <p:nvGrpSpPr>
+        <p:cNvPr id="1" name=""/>
+        <p:cNvGrpSpPr/>
+        <p:nvPr/>
+      </p:nvGrpSpPr>
+      <p:grpSpPr>
+        <a:xfrm>
+          <a:off x="0" y="0"/>
+          <a:ext cx="0" cy="0"/>
+          <a:chOff x="0" y="0"/>
+          <a:chExt cx="0" cy="0"/>
+        </a:xfrm>
+      </p:grpSpPr>
+      <p:sp>
+        <p:nvSpPr>
+          <p:cNvPr id="2" name="슬라이드 이미지 개체 틀 1"/>
+          <p:cNvSpPr>
+            <a:spLocks noGrp="1" noRot="1" noChangeAspect="1"/>
+          </p:cNvSpPr>
+          <p:nvPr>
+            <p:ph type="sldImg"/>
+          </p:nvPr>
+        </p:nvSpPr>
+        <p:spPr/>
+      </p:sp>
+      <p:sp>
+        <p:nvSpPr>
+          <p:cNvPr id="3" name="슬라이드 노트 개체 틀 2"/>
+          <p:cNvSpPr>
+            <a:spLocks noGrp="1"/>
+          </p:cNvSpPr>
+          <p:nvPr>
+            <p:ph type="body" idx="1"/>
+          </p:nvPr>
+        </p:nvSpPr>
+        <p:spPr/>
+        <p:txBody>
+          <a:bodyPr/>
+          <a:lstStyle/>
+          <a:p>
+            <a:r>
+              <a:rPr lang="en-US" altLang="ko-KR" dirty="0" smtClean="0"/>
+              <a:t>In the same paper that introduced Ubuntu dialogue corpus, they introduced their baseline model to decide</a:t>
+            </a:r>
+            <a:r>
+              <a:rPr lang="en-US" altLang="ko-KR" baseline="0" dirty="0" smtClean="0"/>
+              <a:t> the right result. It takes conversations and responses as a vector of words, and the recurrent neural network captures the meaning of each sentences. Then it predicts the response by taking the matrix multiplication of conversation vector and the trained matrix, and get the dot product with the actual response r. As the dot product gets bigger, the prediction goes similar to the answer. Finally, it converts that value to the probability. Then we sort the probability for each candidates to get the top n answers. Now we will introduce our model.</a:t>
+            </a:r>
+            <a:endParaRPr lang="ko-KR" altLang="en-US" dirty="0"/>
+          </a:p>
+        </p:txBody>
+      </p:sp>
+      <p:sp>
+        <p:nvSpPr>
+          <p:cNvPr id="4" name="슬라이드 번호 개체 틀 3"/>
+          <p:cNvSpPr>
+            <a:spLocks noGrp="1"/>
+          </p:cNvSpPr>
+          <p:nvPr>
+            <p:ph type="sldNum" sz="quarter" idx="10"/>
+          </p:nvPr>
+        </p:nvSpPr>
+        <p:spPr/>
+        <p:txBody>
+          <a:bodyPr/>
+          <a:lstStyle/>
+          <a:p>
+            <a:fld id="{7371CE20-0D15-42EA-85C0-6563A297F5E2}" type="slidenum">
+              <a:rPr lang="ko-KR" altLang="en-US" smtClean="0"/>
+              <a:t>9</a:t>
+            </a:fld>
+            <a:endParaRPr lang="ko-KR" altLang="en-US"/>
+          </a:p>
+        </p:txBody>
+      </p:sp>
+    </p:spTree>
+    <p:extLst>
+      <p:ext uri="{BB962C8B-B14F-4D97-AF65-F5344CB8AC3E}">
+        <p14:creationId xmlns:p14="http://schemas.microsoft.com/office/powerpoint/2010/main" val="772265724"/>
+      </p:ext>
+    </p:extLst>
+  </p:cSld>
+  <p:clrMapOvr>
+    <a:masterClrMapping/>
+  </p:clrMapOvr>
+</p:notes>
 </file>
 
 <file path=ppt/slideLayouts/slideLayout1.xml><?xml version="1.0" encoding="utf-8"?>
@@ -3481,7 +4510,7 @@
           <p:nvPr/>
         </p:nvPicPr>
         <p:blipFill>
-          <a:blip r:embed="rId2">
+          <a:blip r:embed="rId3">
             <a:extLst>
               <a:ext uri="{28A0092B-C50C-407E-A947-70E740481C1C}">
                 <a14:useLocalDpi xmlns:a14="http://schemas.microsoft.com/office/drawing/2010/main" val="0"/>
@@ -3514,7 +4543,7 @@
           <p:nvPr/>
         </p:nvPicPr>
         <p:blipFill>
-          <a:blip r:embed="rId3" cstate="print">
+          <a:blip r:embed="rId4" cstate="print">
             <a:extLst>
               <a:ext uri="{28A0092B-C50C-407E-A947-70E740481C1C}">
                 <a14:useLocalDpi xmlns:a14="http://schemas.microsoft.com/office/drawing/2010/main" val="0"/>
@@ -3586,10 +4615,6 @@
               </a:rPr>
               <a:t> for Ubuntu Dialog Corpus </a:t>
             </a:r>
-            <a:endParaRPr lang="en-US" altLang="ko-KR" sz="3600" b="1" dirty="0" smtClean="0">
-              <a:latin typeface="+mj-ea"/>
-              <a:ea typeface="+mj-ea"/>
-            </a:endParaRPr>
           </a:p>
         </p:txBody>
       </p:sp>
@@ -3712,7 +4737,7 @@
           <p:nvPr/>
         </p:nvPicPr>
         <p:blipFill>
-          <a:blip r:embed="rId2" cstate="print">
+          <a:blip r:embed="rId3" cstate="print">
             <a:extLst>
               <a:ext uri="{28A0092B-C50C-407E-A947-70E740481C1C}">
                 <a14:useLocalDpi xmlns:a14="http://schemas.microsoft.com/office/drawing/2010/main" val="0"/>
@@ -3878,12 +4903,6 @@
               </a:rPr>
               <a:t>Conclusion</a:t>
             </a:r>
-            <a:endParaRPr lang="en-US" altLang="ko-KR" b="0" dirty="0" smtClean="0">
-              <a:solidFill>
-                <a:schemeClr val="tx1"/>
-              </a:solidFill>
-              <a:latin typeface="Cambria Math" panose="02040503050406030204" pitchFamily="18" charset="0"/>
-            </a:endParaRPr>
           </a:p>
         </p:txBody>
       </p:sp>
@@ -3978,7 +4997,7 @@
           <p:nvPr/>
         </p:nvPicPr>
         <p:blipFill>
-          <a:blip r:embed="rId2" cstate="print">
+          <a:blip r:embed="rId3" cstate="print">
             <a:extLst>
               <a:ext uri="{28A0092B-C50C-407E-A947-70E740481C1C}">
                 <a14:useLocalDpi xmlns:a14="http://schemas.microsoft.com/office/drawing/2010/main" val="0"/>
@@ -4063,12 +5082,6 @@
               </a:rPr>
               <a:t>- To interact with humans, robots have to understand what is needed for humans and have to answer/react properly</a:t>
             </a:r>
-            <a:endParaRPr lang="en-US" altLang="ko-KR" dirty="0" smtClean="0">
-              <a:solidFill>
-                <a:schemeClr val="tx1"/>
-              </a:solidFill>
-              <a:latin typeface="Cambria Math" panose="02040503050406030204" pitchFamily="18" charset="0"/>
-            </a:endParaRPr>
           </a:p>
           <a:p>
             <a:pPr latinLnBrk="0"/>
@@ -4179,7 +5192,7 @@
             <p:nvPr/>
           </p:nvPicPr>
           <p:blipFill rotWithShape="1">
-            <a:blip r:embed="rId3" cstate="print">
+            <a:blip r:embed="rId4" cstate="print">
               <a:extLst>
                 <a:ext uri="{28A0092B-C50C-407E-A947-70E740481C1C}">
                   <a14:useLocalDpi xmlns:a14="http://schemas.microsoft.com/office/drawing/2010/main" val="0"/>
@@ -4306,7 +5319,7 @@
             <p:nvPr/>
           </p:nvPicPr>
           <p:blipFill rotWithShape="1">
-            <a:blip r:embed="rId4" cstate="print">
+            <a:blip r:embed="rId5" cstate="print">
               <a:extLst>
                 <a:ext uri="{28A0092B-C50C-407E-A947-70E740481C1C}">
                   <a14:useLocalDpi xmlns:a14="http://schemas.microsoft.com/office/drawing/2010/main" val="0"/>
@@ -4373,7 +5386,7 @@
           <p:nvPr/>
         </p:nvPicPr>
         <p:blipFill>
-          <a:blip r:embed="rId2" cstate="print">
+          <a:blip r:embed="rId3" cstate="print">
             <a:extLst>
               <a:ext uri="{28A0092B-C50C-407E-A947-70E740481C1C}">
                 <a14:useLocalDpi xmlns:a14="http://schemas.microsoft.com/office/drawing/2010/main" val="0"/>
@@ -4467,12 +5480,6 @@
               </a:rPr>
               <a:t>Also, they somehow have to recognize not a full sentence, even with broken grammar or some typos/abbreviations.</a:t>
             </a:r>
-            <a:endParaRPr lang="en-US" altLang="ko-KR" dirty="0" smtClean="0">
-              <a:solidFill>
-                <a:schemeClr val="tx1"/>
-              </a:solidFill>
-              <a:latin typeface="Cambria Math" panose="02040503050406030204" pitchFamily="18" charset="0"/>
-            </a:endParaRPr>
           </a:p>
           <a:p>
             <a:pPr latinLnBrk="0"/>
@@ -4687,7 +5694,7 @@
           <p:nvPr/>
         </p:nvPicPr>
         <p:blipFill rotWithShape="1">
-          <a:blip r:embed="rId3" cstate="print">
+          <a:blip r:embed="rId4" cstate="print">
             <a:extLst>
               <a:ext uri="{28A0092B-C50C-407E-A947-70E740481C1C}">
                 <a14:useLocalDpi xmlns:a14="http://schemas.microsoft.com/office/drawing/2010/main" val="0"/>
@@ -4730,7 +5737,7 @@
             <p:nvPr/>
           </p:nvPicPr>
           <p:blipFill rotWithShape="1">
-            <a:blip r:embed="rId4" cstate="print">
+            <a:blip r:embed="rId5" cstate="print">
               <a:extLst>
                 <a:ext uri="{28A0092B-C50C-407E-A947-70E740481C1C}">
                   <a14:useLocalDpi xmlns:a14="http://schemas.microsoft.com/office/drawing/2010/main" val="0"/>
@@ -4832,7 +5839,7 @@
           <p:nvPr/>
         </p:nvPicPr>
         <p:blipFill>
-          <a:blip r:embed="rId2" cstate="print">
+          <a:blip r:embed="rId3" cstate="print">
             <a:extLst>
               <a:ext uri="{28A0092B-C50C-407E-A947-70E740481C1C}">
                 <a14:useLocalDpi xmlns:a14="http://schemas.microsoft.com/office/drawing/2010/main" val="0"/>
@@ -5172,7 +6179,7 @@
           <p:nvPr/>
         </p:nvPicPr>
         <p:blipFill rotWithShape="1">
-          <a:blip r:embed="rId3" cstate="print">
+          <a:blip r:embed="rId4" cstate="print">
             <a:extLst>
               <a:ext uri="{28A0092B-C50C-407E-A947-70E740481C1C}">
                 <a14:useLocalDpi xmlns:a14="http://schemas.microsoft.com/office/drawing/2010/main" val="0"/>
@@ -5201,7 +6208,7 @@
           <p:nvPr/>
         </p:nvPicPr>
         <p:blipFill rotWithShape="1">
-          <a:blip r:embed="rId4" cstate="print">
+          <a:blip r:embed="rId5" cstate="print">
             <a:extLst>
               <a:ext uri="{28A0092B-C50C-407E-A947-70E740481C1C}">
                 <a14:useLocalDpi xmlns:a14="http://schemas.microsoft.com/office/drawing/2010/main" val="0"/>
@@ -5267,7 +6274,7 @@
           <p:nvPr/>
         </p:nvPicPr>
         <p:blipFill>
-          <a:blip r:embed="rId2" cstate="print">
+          <a:blip r:embed="rId3" cstate="print">
             <a:extLst>
               <a:ext uri="{28A0092B-C50C-407E-A947-70E740481C1C}">
                 <a14:useLocalDpi xmlns:a14="http://schemas.microsoft.com/office/drawing/2010/main" val="0"/>
@@ -5466,12 +6473,6 @@
               </a:rPr>
               <a:t>hich should not be hand-crafted, rule-based systems or based on hand-crafted features</a:t>
             </a:r>
-            <a:endParaRPr lang="en-US" altLang="ko-KR" dirty="0" smtClean="0">
-              <a:solidFill>
-                <a:schemeClr val="tx1"/>
-              </a:solidFill>
-              <a:latin typeface="Cambria Math" panose="02040503050406030204" pitchFamily="18" charset="0"/>
-            </a:endParaRPr>
           </a:p>
         </p:txBody>
       </p:sp>
@@ -5566,7 +6567,7 @@
           <p:nvPr/>
         </p:nvPicPr>
         <p:blipFill>
-          <a:blip r:embed="rId2" cstate="print">
+          <a:blip r:embed="rId3" cstate="print">
             <a:extLst>
               <a:ext uri="{28A0092B-C50C-407E-A947-70E740481C1C}">
                 <a14:useLocalDpi xmlns:a14="http://schemas.microsoft.com/office/drawing/2010/main" val="0"/>
@@ -5693,12 +6694,6 @@
               </a:rPr>
               <a:t>problem</a:t>
             </a:r>
-            <a:endParaRPr lang="en-US" altLang="ko-KR" dirty="0" smtClean="0">
-              <a:solidFill>
-                <a:schemeClr val="tx1"/>
-              </a:solidFill>
-              <a:latin typeface="Cambria Math" panose="02040503050406030204" pitchFamily="18" charset="0"/>
-            </a:endParaRPr>
           </a:p>
           <a:p>
             <a:pPr latinLnBrk="0"/>
@@ -5932,17 +6927,7 @@
                 <a:latin typeface="Cambria Math" panose="02040503050406030204" pitchFamily="18" charset="0"/>
                 <a:ea typeface="Cambria Math" panose="02040503050406030204" pitchFamily="18" charset="0"/>
               </a:rPr>
-              <a:t>Systems </a:t>
-            </a:r>
-            <a:r>
-              <a:rPr lang="en-US" altLang="ko-KR" dirty="0" smtClean="0">
-                <a:solidFill>
-                  <a:schemeClr val="tx1"/>
-                </a:solidFill>
-                <a:latin typeface="Cambria Math" panose="02040503050406030204" pitchFamily="18" charset="0"/>
-                <a:ea typeface="Cambria Math" panose="02040503050406030204" pitchFamily="18" charset="0"/>
-              </a:rPr>
-              <a:t>arXiv:1506.08909v3 [cs.CL]</a:t>
+              <a:t>Systems arXiv:1506.08909v3 [cs.CL]</a:t>
             </a:r>
             <a:endParaRPr lang="ko-KR" altLang="en-US" dirty="0">
               <a:solidFill>
@@ -5999,7 +6984,7 @@
           <p:nvPr/>
         </p:nvPicPr>
         <p:blipFill>
-          <a:blip r:embed="rId2" cstate="print">
+          <a:blip r:embed="rId3" cstate="print">
             <a:extLst>
               <a:ext uri="{28A0092B-C50C-407E-A947-70E740481C1C}">
                 <a14:useLocalDpi xmlns:a14="http://schemas.microsoft.com/office/drawing/2010/main" val="0"/>
@@ -6533,7 +7518,79 @@
                 </a:solidFill>
                 <a:latin typeface="Cambria Math" panose="02040503050406030204" pitchFamily="18" charset="0"/>
               </a:rPr>
-              <a:t>3: I doubt they would even consider giving support... __</a:t>
+              <a:t>3: I doubt they would even consider giving support... </a:t>
+            </a:r>
+            <a:endParaRPr lang="en-US" altLang="ko-KR" sz="1400" dirty="0" smtClean="0">
+              <a:solidFill>
+                <a:schemeClr val="tx1"/>
+              </a:solidFill>
+              <a:latin typeface="Cambria Math" panose="02040503050406030204" pitchFamily="18" charset="0"/>
+            </a:endParaRPr>
+          </a:p>
+          <a:p>
+            <a:pPr latinLnBrk="0"/>
+            <a:r>
+              <a:rPr lang="en-US" altLang="ko-KR" sz="1400" dirty="0">
+                <a:solidFill>
+                  <a:schemeClr val="tx1"/>
+                </a:solidFill>
+                <a:latin typeface="Cambria Math" panose="02040503050406030204" pitchFamily="18" charset="0"/>
+              </a:rPr>
+              <a:t>12: no </a:t>
+            </a:r>
+            <a:endParaRPr lang="en-US" altLang="ko-KR" sz="1400" dirty="0" smtClean="0">
+              <a:solidFill>
+                <a:schemeClr val="tx1"/>
+              </a:solidFill>
+              <a:latin typeface="Cambria Math" panose="02040503050406030204" pitchFamily="18" charset="0"/>
+            </a:endParaRPr>
+          </a:p>
+          <a:p>
+            <a:pPr latinLnBrk="0"/>
+            <a:r>
+              <a:rPr lang="en-US" altLang="ko-KR" sz="1400" dirty="0">
+                <a:solidFill>
+                  <a:schemeClr val="tx1"/>
+                </a:solidFill>
+                <a:latin typeface="Cambria Math" panose="02040503050406030204" pitchFamily="18" charset="0"/>
+              </a:rPr>
+              <a:t>26: I'm not sure then. </a:t>
+            </a:r>
+            <a:endParaRPr lang="en-US" altLang="ko-KR" sz="1400" dirty="0" smtClean="0">
+              <a:solidFill>
+                <a:schemeClr val="tx1"/>
+              </a:solidFill>
+              <a:latin typeface="Cambria Math" panose="02040503050406030204" pitchFamily="18" charset="0"/>
+            </a:endParaRPr>
+          </a:p>
+          <a:p>
+            <a:pPr latinLnBrk="0"/>
+            <a:r>
+              <a:rPr lang="en-US" altLang="ko-KR" sz="1400" dirty="0">
+                <a:solidFill>
+                  <a:schemeClr val="tx1"/>
+                </a:solidFill>
+                <a:latin typeface="Cambria Math" panose="02040503050406030204" pitchFamily="18" charset="0"/>
+              </a:rPr>
+              <a:t>41: ok, let that finish first then </a:t>
+            </a:r>
+            <a:endParaRPr lang="en-US" altLang="ko-KR" sz="1400" dirty="0" smtClean="0">
+              <a:solidFill>
+                <a:schemeClr val="tx1"/>
+              </a:solidFill>
+              <a:latin typeface="Cambria Math" panose="02040503050406030204" pitchFamily="18" charset="0"/>
+            </a:endParaRPr>
+          </a:p>
+          <a:p>
+            <a:pPr latinLnBrk="0"/>
+            <a:r>
+              <a:rPr lang="en-US" altLang="ko-KR" sz="1400" dirty="0">
+                <a:solidFill>
+                  <a:schemeClr val="tx1"/>
+                </a:solidFill>
+                <a:latin typeface="Cambria Math" panose="02040503050406030204" pitchFamily="18" charset="0"/>
+              </a:rPr>
+              <a:t>67: use /join #</a:t>
             </a:r>
             <a:r>
               <a:rPr lang="en-US" altLang="ko-KR" sz="1400" dirty="0" err="1">
@@ -6542,8 +7599,74 @@
                 </a:solidFill>
                 <a:latin typeface="Cambria Math" panose="02040503050406030204" pitchFamily="18" charset="0"/>
               </a:rPr>
-              <a:t>eou</a:t>
-            </a:r>
+              <a:t>kubuntu</a:t>
+            </a:r>
+            <a:r>
+              <a:rPr lang="en-US" altLang="ko-KR" sz="1400" dirty="0">
+                <a:solidFill>
+                  <a:schemeClr val="tx1"/>
+                </a:solidFill>
+                <a:latin typeface="Cambria Math" panose="02040503050406030204" pitchFamily="18" charset="0"/>
+              </a:rPr>
+              <a:t>-de </a:t>
+            </a:r>
+            <a:endParaRPr lang="en-US" altLang="ko-KR" sz="1400" dirty="0" smtClean="0">
+              <a:solidFill>
+                <a:schemeClr val="tx1"/>
+              </a:solidFill>
+              <a:latin typeface="Cambria Math" panose="02040503050406030204" pitchFamily="18" charset="0"/>
+            </a:endParaRPr>
+          </a:p>
+          <a:p>
+            <a:pPr latinLnBrk="0"/>
+            <a:r>
+              <a:rPr lang="en-US" altLang="ko-KR" sz="1400" dirty="0">
+                <a:solidFill>
+                  <a:schemeClr val="tx1"/>
+                </a:solidFill>
+                <a:latin typeface="Cambria Math" panose="02040503050406030204" pitchFamily="18" charset="0"/>
+              </a:rPr>
+              <a:t>82: No, but I got </a:t>
+            </a:r>
+            <a:r>
+              <a:rPr lang="en-US" altLang="ko-KR" sz="1400" dirty="0" err="1">
+                <a:solidFill>
+                  <a:schemeClr val="tx1"/>
+                </a:solidFill>
+                <a:latin typeface="Cambria Math" panose="02040503050406030204" pitchFamily="18" charset="0"/>
+              </a:rPr>
+              <a:t>gtkpod</a:t>
+            </a:r>
+            <a:r>
+              <a:rPr lang="en-US" altLang="ko-KR" sz="1400" dirty="0">
+                <a:solidFill>
+                  <a:schemeClr val="tx1"/>
+                </a:solidFill>
+                <a:latin typeface="Cambria Math" panose="02040503050406030204" pitchFamily="18" charset="0"/>
+              </a:rPr>
+              <a:t> to work perfectly with my </a:t>
+            </a:r>
+            <a:r>
+              <a:rPr lang="en-US" altLang="ko-KR" sz="1400" dirty="0" err="1">
+                <a:solidFill>
+                  <a:schemeClr val="tx1"/>
+                </a:solidFill>
+                <a:latin typeface="Cambria Math" panose="02040503050406030204" pitchFamily="18" charset="0"/>
+              </a:rPr>
+              <a:t>nano</a:t>
+            </a:r>
+            <a:r>
+              <a:rPr lang="en-US" altLang="ko-KR" sz="1400" dirty="0">
+                <a:solidFill>
+                  <a:schemeClr val="tx1"/>
+                </a:solidFill>
+                <a:latin typeface="Cambria Math" panose="02040503050406030204" pitchFamily="18" charset="0"/>
+              </a:rPr>
+              <a:t> and breezy </a:t>
+            </a:r>
+          </a:p>
+          <a:p>
+            <a:pPr latinLnBrk="0"/>
             <a:r>
               <a:rPr lang="en-US" altLang="ko-KR" sz="1400" dirty="0" smtClean="0">
                 <a:solidFill>
@@ -6551,19 +7674,55 @@
                 </a:solidFill>
                 <a:latin typeface="Cambria Math" panose="02040503050406030204" pitchFamily="18" charset="0"/>
               </a:rPr>
-              <a:t>__</a:t>
+              <a:t>91</a:t>
+            </a:r>
+            <a:r>
+              <a:rPr lang="en-US" altLang="ko-KR" sz="1400" dirty="0">
+                <a:solidFill>
+                  <a:schemeClr val="tx1"/>
+                </a:solidFill>
+                <a:latin typeface="Cambria Math" panose="02040503050406030204" pitchFamily="18" charset="0"/>
+              </a:rPr>
+              <a:t>: I </a:t>
+            </a:r>
+            <a:r>
+              <a:rPr lang="en-US" altLang="ko-KR" sz="1400" dirty="0" err="1">
+                <a:solidFill>
+                  <a:schemeClr val="tx1"/>
+                </a:solidFill>
+                <a:latin typeface="Cambria Math" panose="02040503050406030204" pitchFamily="18" charset="0"/>
+              </a:rPr>
+              <a:t>dont</a:t>
+            </a:r>
+            <a:r>
+              <a:rPr lang="en-US" altLang="ko-KR" sz="1400" dirty="0">
+                <a:solidFill>
+                  <a:schemeClr val="tx1"/>
+                </a:solidFill>
+                <a:latin typeface="Cambria Math" panose="02040503050406030204" pitchFamily="18" charset="0"/>
+              </a:rPr>
+              <a:t> know, you said it was 4yrs old, I thought you may know of the bug off hand. </a:t>
             </a:r>
           </a:p>
           <a:p>
             <a:pPr latinLnBrk="0"/>
             <a:r>
+              <a:rPr lang="en-US" altLang="ko-KR" sz="1400" dirty="0" smtClean="0">
+                <a:solidFill>
+                  <a:schemeClr val="tx1"/>
+                </a:solidFill>
+                <a:latin typeface="Cambria Math" panose="02040503050406030204" pitchFamily="18" charset="0"/>
+              </a:rPr>
+              <a:t>98</a:t>
+            </a:r>
+            <a:r>
               <a:rPr lang="en-US" altLang="ko-KR" sz="1400" dirty="0">
                 <a:solidFill>
                   <a:schemeClr val="tx1"/>
                 </a:solidFill>
                 <a:latin typeface="Cambria Math" panose="02040503050406030204" pitchFamily="18" charset="0"/>
               </a:rPr>
-              <a:t>12: no __</a:t>
+              <a:t>: </a:t>
             </a:r>
             <a:r>
               <a:rPr lang="en-US" altLang="ko-KR" sz="1400" dirty="0" err="1">
@@ -6572,20 +7731,8 @@
                 </a:solidFill>
                 <a:latin typeface="Cambria Math" panose="02040503050406030204" pitchFamily="18" charset="0"/>
               </a:rPr>
-              <a:t>eou</a:t>
-            </a:r>
-            <a:r>
-              <a:rPr lang="en-US" altLang="ko-KR" sz="1400" dirty="0" smtClean="0">
-                <a:solidFill>
-                  <a:schemeClr val="tx1"/>
-                </a:solidFill>
-                <a:latin typeface="Cambria Math" panose="02040503050406030204" pitchFamily="18" charset="0"/>
-              </a:rPr>
-              <a:t>__</a:t>
-            </a:r>
-          </a:p>
-          <a:p>
-            <a:pPr latinLnBrk="0"/>
+              <a:t>itm</a:t>
+            </a:r>
             <a:r>
               <a:rPr lang="en-US" altLang="ko-KR" sz="1400" dirty="0">
                 <a:solidFill>
@@ -6593,283 +7740,7 @@
                 </a:solidFill>
                 <a:latin typeface="Cambria Math" panose="02040503050406030204" pitchFamily="18" charset="0"/>
               </a:rPr>
-              <a:t>26: I'm not sure then. __</a:t>
-            </a:r>
-            <a:r>
-              <a:rPr lang="en-US" altLang="ko-KR" sz="1400" dirty="0" err="1">
-                <a:solidFill>
-                  <a:schemeClr val="tx1"/>
-                </a:solidFill>
-                <a:latin typeface="Cambria Math" panose="02040503050406030204" pitchFamily="18" charset="0"/>
-              </a:rPr>
-              <a:t>eou</a:t>
-            </a:r>
-            <a:r>
-              <a:rPr lang="en-US" altLang="ko-KR" sz="1400" dirty="0" smtClean="0">
-                <a:solidFill>
-                  <a:schemeClr val="tx1"/>
-                </a:solidFill>
-                <a:latin typeface="Cambria Math" panose="02040503050406030204" pitchFamily="18" charset="0"/>
-              </a:rPr>
-              <a:t>__</a:t>
-            </a:r>
-          </a:p>
-          <a:p>
-            <a:pPr latinLnBrk="0"/>
-            <a:r>
-              <a:rPr lang="en-US" altLang="ko-KR" sz="1400" dirty="0">
-                <a:solidFill>
-                  <a:schemeClr val="tx1"/>
-                </a:solidFill>
-                <a:latin typeface="Cambria Math" panose="02040503050406030204" pitchFamily="18" charset="0"/>
-              </a:rPr>
-              <a:t>41: ok, let that finish first then __</a:t>
-            </a:r>
-            <a:r>
-              <a:rPr lang="en-US" altLang="ko-KR" sz="1400" dirty="0" err="1">
-                <a:solidFill>
-                  <a:schemeClr val="tx1"/>
-                </a:solidFill>
-                <a:latin typeface="Cambria Math" panose="02040503050406030204" pitchFamily="18" charset="0"/>
-              </a:rPr>
-              <a:t>eou</a:t>
-            </a:r>
-            <a:r>
-              <a:rPr lang="en-US" altLang="ko-KR" sz="1400" dirty="0" smtClean="0">
-                <a:solidFill>
-                  <a:schemeClr val="tx1"/>
-                </a:solidFill>
-                <a:latin typeface="Cambria Math" panose="02040503050406030204" pitchFamily="18" charset="0"/>
-              </a:rPr>
-              <a:t>__</a:t>
-            </a:r>
-          </a:p>
-          <a:p>
-            <a:pPr latinLnBrk="0"/>
-            <a:r>
-              <a:rPr lang="en-US" altLang="ko-KR" sz="1400" dirty="0">
-                <a:solidFill>
-                  <a:schemeClr val="tx1"/>
-                </a:solidFill>
-                <a:latin typeface="Cambria Math" panose="02040503050406030204" pitchFamily="18" charset="0"/>
-              </a:rPr>
-              <a:t>67: use /join #</a:t>
-            </a:r>
-            <a:r>
-              <a:rPr lang="en-US" altLang="ko-KR" sz="1400" dirty="0" err="1">
-                <a:solidFill>
-                  <a:schemeClr val="tx1"/>
-                </a:solidFill>
-                <a:latin typeface="Cambria Math" panose="02040503050406030204" pitchFamily="18" charset="0"/>
-              </a:rPr>
-              <a:t>kubuntu</a:t>
-            </a:r>
-            <a:r>
-              <a:rPr lang="en-US" altLang="ko-KR" sz="1400" dirty="0">
-                <a:solidFill>
-                  <a:schemeClr val="tx1"/>
-                </a:solidFill>
-                <a:latin typeface="Cambria Math" panose="02040503050406030204" pitchFamily="18" charset="0"/>
-              </a:rPr>
-              <a:t>-de __</a:t>
-            </a:r>
-            <a:r>
-              <a:rPr lang="en-US" altLang="ko-KR" sz="1400" dirty="0" err="1">
-                <a:solidFill>
-                  <a:schemeClr val="tx1"/>
-                </a:solidFill>
-                <a:latin typeface="Cambria Math" panose="02040503050406030204" pitchFamily="18" charset="0"/>
-              </a:rPr>
-              <a:t>eou</a:t>
-            </a:r>
-            <a:r>
-              <a:rPr lang="en-US" altLang="ko-KR" sz="1400" dirty="0" smtClean="0">
-                <a:solidFill>
-                  <a:schemeClr val="tx1"/>
-                </a:solidFill>
-                <a:latin typeface="Cambria Math" panose="02040503050406030204" pitchFamily="18" charset="0"/>
-              </a:rPr>
-              <a:t>__</a:t>
-            </a:r>
-          </a:p>
-          <a:p>
-            <a:pPr latinLnBrk="0"/>
-            <a:r>
-              <a:rPr lang="en-US" altLang="ko-KR" sz="1400" dirty="0">
-                <a:solidFill>
-                  <a:schemeClr val="tx1"/>
-                </a:solidFill>
-                <a:latin typeface="Cambria Math" panose="02040503050406030204" pitchFamily="18" charset="0"/>
-              </a:rPr>
-              <a:t>82: No, but I got </a:t>
-            </a:r>
-            <a:r>
-              <a:rPr lang="en-US" altLang="ko-KR" sz="1400" dirty="0" err="1">
-                <a:solidFill>
-                  <a:schemeClr val="tx1"/>
-                </a:solidFill>
-                <a:latin typeface="Cambria Math" panose="02040503050406030204" pitchFamily="18" charset="0"/>
-              </a:rPr>
-              <a:t>gtkpod</a:t>
-            </a:r>
-            <a:r>
-              <a:rPr lang="en-US" altLang="ko-KR" sz="1400" dirty="0">
-                <a:solidFill>
-                  <a:schemeClr val="tx1"/>
-                </a:solidFill>
-                <a:latin typeface="Cambria Math" panose="02040503050406030204" pitchFamily="18" charset="0"/>
-              </a:rPr>
-              <a:t> to work perfectly with my </a:t>
-            </a:r>
-            <a:r>
-              <a:rPr lang="en-US" altLang="ko-KR" sz="1400" dirty="0" err="1">
-                <a:solidFill>
-                  <a:schemeClr val="tx1"/>
-                </a:solidFill>
-                <a:latin typeface="Cambria Math" panose="02040503050406030204" pitchFamily="18" charset="0"/>
-              </a:rPr>
-              <a:t>nano</a:t>
-            </a:r>
-            <a:r>
-              <a:rPr lang="en-US" altLang="ko-KR" sz="1400" dirty="0">
-                <a:solidFill>
-                  <a:schemeClr val="tx1"/>
-                </a:solidFill>
-                <a:latin typeface="Cambria Math" panose="02040503050406030204" pitchFamily="18" charset="0"/>
-              </a:rPr>
-              <a:t> and breezy __</a:t>
-            </a:r>
-            <a:r>
-              <a:rPr lang="en-US" altLang="ko-KR" sz="1400" dirty="0" err="1">
-                <a:solidFill>
-                  <a:schemeClr val="tx1"/>
-                </a:solidFill>
-                <a:latin typeface="Cambria Math" panose="02040503050406030204" pitchFamily="18" charset="0"/>
-              </a:rPr>
-              <a:t>eou</a:t>
-            </a:r>
-            <a:r>
-              <a:rPr lang="en-US" altLang="ko-KR" sz="1400" dirty="0">
-                <a:solidFill>
-                  <a:schemeClr val="tx1"/>
-                </a:solidFill>
-                <a:latin typeface="Cambria Math" panose="02040503050406030204" pitchFamily="18" charset="0"/>
-              </a:rPr>
-              <a:t>__</a:t>
-            </a:r>
-          </a:p>
-          <a:p>
-            <a:pPr latinLnBrk="0"/>
-            <a:r>
-              <a:rPr lang="en-US" altLang="ko-KR" sz="1400" dirty="0" smtClean="0">
-                <a:solidFill>
-                  <a:schemeClr val="tx1"/>
-                </a:solidFill>
-                <a:latin typeface="Cambria Math" panose="02040503050406030204" pitchFamily="18" charset="0"/>
-              </a:rPr>
-              <a:t>91</a:t>
-            </a:r>
-            <a:r>
-              <a:rPr lang="en-US" altLang="ko-KR" sz="1400" dirty="0">
-                <a:solidFill>
-                  <a:schemeClr val="tx1"/>
-                </a:solidFill>
-                <a:latin typeface="Cambria Math" panose="02040503050406030204" pitchFamily="18" charset="0"/>
-              </a:rPr>
-              <a:t>: I </a:t>
-            </a:r>
-            <a:r>
-              <a:rPr lang="en-US" altLang="ko-KR" sz="1400" dirty="0" err="1">
-                <a:solidFill>
-                  <a:schemeClr val="tx1"/>
-                </a:solidFill>
-                <a:latin typeface="Cambria Math" panose="02040503050406030204" pitchFamily="18" charset="0"/>
-              </a:rPr>
-              <a:t>dont</a:t>
-            </a:r>
-            <a:r>
-              <a:rPr lang="en-US" altLang="ko-KR" sz="1400" dirty="0">
-                <a:solidFill>
-                  <a:schemeClr val="tx1"/>
-                </a:solidFill>
-                <a:latin typeface="Cambria Math" panose="02040503050406030204" pitchFamily="18" charset="0"/>
-              </a:rPr>
-              <a:t> know, you said it was 4yrs old, I thought you may know of the bug off hand. __</a:t>
-            </a:r>
-            <a:r>
-              <a:rPr lang="en-US" altLang="ko-KR" sz="1400" dirty="0" err="1">
-                <a:solidFill>
-                  <a:schemeClr val="tx1"/>
-                </a:solidFill>
-                <a:latin typeface="Cambria Math" panose="02040503050406030204" pitchFamily="18" charset="0"/>
-              </a:rPr>
-              <a:t>eou</a:t>
-            </a:r>
-            <a:r>
-              <a:rPr lang="en-US" altLang="ko-KR" sz="1400" dirty="0">
-                <a:solidFill>
-                  <a:schemeClr val="tx1"/>
-                </a:solidFill>
-                <a:latin typeface="Cambria Math" panose="02040503050406030204" pitchFamily="18" charset="0"/>
-              </a:rPr>
-              <a:t>__</a:t>
-            </a:r>
-          </a:p>
-          <a:p>
-            <a:pPr latinLnBrk="0"/>
-            <a:r>
-              <a:rPr lang="en-US" altLang="ko-KR" sz="1400" dirty="0" smtClean="0">
-                <a:solidFill>
-                  <a:schemeClr val="tx1"/>
-                </a:solidFill>
-                <a:latin typeface="Cambria Math" panose="02040503050406030204" pitchFamily="18" charset="0"/>
-              </a:rPr>
-              <a:t>98</a:t>
-            </a:r>
-            <a:r>
-              <a:rPr lang="en-US" altLang="ko-KR" sz="1400" dirty="0">
-                <a:solidFill>
-                  <a:schemeClr val="tx1"/>
-                </a:solidFill>
-                <a:latin typeface="Cambria Math" panose="02040503050406030204" pitchFamily="18" charset="0"/>
-              </a:rPr>
-              <a:t>: </a:t>
-            </a:r>
-            <a:r>
-              <a:rPr lang="en-US" altLang="ko-KR" sz="1400" dirty="0" err="1">
-                <a:solidFill>
-                  <a:schemeClr val="tx1"/>
-                </a:solidFill>
-                <a:latin typeface="Cambria Math" panose="02040503050406030204" pitchFamily="18" charset="0"/>
-              </a:rPr>
-              <a:t>itm</a:t>
-            </a:r>
-            <a:r>
-              <a:rPr lang="en-US" altLang="ko-KR" sz="1400" dirty="0">
-                <a:solidFill>
-                  <a:schemeClr val="tx1"/>
-                </a:solidFill>
-                <a:latin typeface="Cambria Math" panose="02040503050406030204" pitchFamily="18" charset="0"/>
-              </a:rPr>
-              <a:t> must be in options - somewhere __</a:t>
-            </a:r>
-            <a:r>
-              <a:rPr lang="en-US" altLang="ko-KR" sz="1400" dirty="0" err="1">
-                <a:solidFill>
-                  <a:schemeClr val="tx1"/>
-                </a:solidFill>
-                <a:latin typeface="Cambria Math" panose="02040503050406030204" pitchFamily="18" charset="0"/>
-              </a:rPr>
-              <a:t>eou</a:t>
-            </a:r>
-            <a:r>
-              <a:rPr lang="en-US" altLang="ko-KR" sz="1400" dirty="0">
-                <a:solidFill>
-                  <a:schemeClr val="tx1"/>
-                </a:solidFill>
-                <a:latin typeface="Cambria Math" panose="02040503050406030204" pitchFamily="18" charset="0"/>
-              </a:rPr>
-              <a:t>__</a:t>
+              <a:t> must be in options - somewhere </a:t>
             </a:r>
           </a:p>
         </p:txBody>
@@ -6965,7 +7836,7 @@
           <p:nvPr/>
         </p:nvPicPr>
         <p:blipFill>
-          <a:blip r:embed="rId2" cstate="print">
+          <a:blip r:embed="rId3" cstate="print">
             <a:extLst>
               <a:ext uri="{28A0092B-C50C-407E-A947-70E740481C1C}">
                 <a14:useLocalDpi xmlns:a14="http://schemas.microsoft.com/office/drawing/2010/main" val="0"/>
@@ -6990,8 +7861,8 @@
           </a:ln>
         </p:spPr>
       </p:pic>
-      <mc:AlternateContent xmlns:mc="http://schemas.openxmlformats.org/markup-compatibility/2006">
-        <mc:Choice xmlns:a14="http://schemas.microsoft.com/office/drawing/2010/main" Requires="a14">
+      <mc:AlternateContent xmlns:mc="http://schemas.openxmlformats.org/markup-compatibility/2006" xmlns:a14="http://schemas.microsoft.com/office/drawing/2010/main">
+        <mc:Choice Requires="a14">
           <p:sp>
             <p:nvSpPr>
               <p:cNvPr id="7" name="TextBox 6"/>
@@ -7417,7 +8288,7 @@
             </p:txBody>
           </p:sp>
         </mc:Choice>
-        <mc:Fallback>
+        <mc:Fallback xmlns="">
           <p:sp>
             <p:nvSpPr>
               <p:cNvPr id="7" name="TextBox 6"/>
@@ -7435,7 +8306,7 @@
                 <a:avLst/>
               </a:prstGeom>
               <a:blipFill>
-                <a:blip r:embed="rId3"/>
+                <a:blip r:embed="rId4"/>
                 <a:stretch>
                   <a:fillRect l="-545" t="-2893" b="-5372"/>
                 </a:stretch>
@@ -7553,17 +8424,7 @@
                 <a:latin typeface="Cambria Math" panose="02040503050406030204" pitchFamily="18" charset="0"/>
                 <a:ea typeface="Cambria Math" panose="02040503050406030204" pitchFamily="18" charset="0"/>
               </a:rPr>
-              <a:t>Systems </a:t>
-            </a:r>
-            <a:r>
-              <a:rPr lang="en-US" altLang="ko-KR" dirty="0" smtClean="0">
-                <a:solidFill>
-                  <a:schemeClr val="tx1"/>
-                </a:solidFill>
-                <a:latin typeface="Cambria Math" panose="02040503050406030204" pitchFamily="18" charset="0"/>
-                <a:ea typeface="Cambria Math" panose="02040503050406030204" pitchFamily="18" charset="0"/>
-              </a:rPr>
-              <a:t>arXiv:1506.08909v3 [cs.CL]</a:t>
+              <a:t>Systems arXiv:1506.08909v3 [cs.CL]</a:t>
             </a:r>
             <a:endParaRPr lang="ko-KR" altLang="en-US" dirty="0">
               <a:solidFill>
@@ -7597,7 +8458,7 @@
             <p:nvPr/>
           </p:nvPicPr>
           <p:blipFill>
-            <a:blip r:embed="rId4"/>
+            <a:blip r:embed="rId5"/>
             <a:stretch>
               <a:fillRect/>
             </a:stretch>

</xml_diff>

<commit_message>
Fix scripts and add materials suggested
</commit_message>
<xml_diff>
--- a/Team Project/Presentation/Presentation - Team 1.pptx
+++ b/Team Project/Presentation/Presentation - Team 1.pptx
@@ -216,7 +216,7 @@
           <a:p>
             <a:fld id="{4C549C21-CECB-4610-AA0C-CD8563E3DC01}" type="datetimeFigureOut">
               <a:rPr lang="ko-KR" altLang="en-US" smtClean="0"/>
-              <a:t>2018-12-03</a:t>
+              <a:t>2018-12-04</a:t>
             </a:fld>
             <a:endParaRPr lang="ko-KR" altLang="en-US"/>
           </a:p>
@@ -741,7 +741,15 @@
           <a:p>
             <a:r>
               <a:rPr lang="en-US" altLang="ko-KR" baseline="0" dirty="0" smtClean="0"/>
-              <a:t>For the sense of the intelligent mechanics, robots have to interact with humans properly, so they have to understand what is need for humans. </a:t>
+              <a:t>For the sense of the intelligent mechanics, robots have to interact with humans properly, so they have to understand what is </a:t>
+            </a:r>
+            <a:r>
+              <a:rPr lang="en-US" altLang="ko-KR" baseline="0" dirty="0" smtClean="0"/>
+              <a:t>needed </a:t>
+            </a:r>
+            <a:r>
+              <a:rPr lang="en-US" altLang="ko-KR" baseline="0" dirty="0" smtClean="0"/>
+              <a:t>for humans. </a:t>
             </a:r>
           </a:p>
           <a:p>
@@ -761,14 +769,23 @@
           <a:p>
             <a:r>
               <a:rPr lang="en-US" altLang="ko-KR" baseline="0" dirty="0" smtClean="0"/>
-              <a:t>Google launched google assistant for their android phones. </a:t>
-            </a:r>
-          </a:p>
-          <a:p>
+              <a:t>For instance, Google </a:t>
+            </a:r>
             <a:r>
               <a:rPr lang="en-US" altLang="ko-KR" baseline="0" dirty="0" smtClean="0"/>
-              <a:t>Banks of Korea also introduced their own clerks and encourage users to get the answer by text.</a:t>
-            </a:r>
+              <a:t>launched google assistant for their android phones. </a:t>
+            </a:r>
+          </a:p>
+          <a:p>
+            <a:r>
+              <a:rPr lang="en-US" altLang="ko-KR" baseline="0" dirty="0" smtClean="0"/>
+              <a:t>Banks of Korea also introduced their own clerks and encourage users to get the answer by </a:t>
+            </a:r>
+            <a:r>
+              <a:rPr lang="en-US" altLang="ko-KR" baseline="0" dirty="0" smtClean="0"/>
+              <a:t>text dialogue.</a:t>
+            </a:r>
+            <a:endParaRPr lang="en-US" altLang="ko-KR" baseline="0" dirty="0" smtClean="0"/>
           </a:p>
           <a:p>
             <a:endParaRPr lang="ko-KR" altLang="en-US" dirty="0"/>
@@ -869,7 +886,52 @@
             </a:r>
             <a:r>
               <a:rPr lang="en-US" altLang="ko-KR" baseline="0" dirty="0" smtClean="0"/>
-              <a:t>. For instance they have to answer similarly for inputs having similar meaning. Even if we enter exchange rate of 100 dollars rather than the exchange of 100 dollars on the bank clerk, we want to get the amount of Korean won corresponding to 100 dollar. Sometimes, we may enter a not-completed sentences, typos, or even abbreviations for the </a:t>
+              <a:t>. </a:t>
+            </a:r>
+            <a:endParaRPr lang="en-US" altLang="ko-KR" baseline="0" dirty="0" smtClean="0"/>
+          </a:p>
+          <a:p>
+            <a:r>
+              <a:rPr lang="en-US" altLang="ko-KR" baseline="0" dirty="0" smtClean="0"/>
+              <a:t>For </a:t>
+            </a:r>
+            <a:r>
+              <a:rPr lang="en-US" altLang="ko-KR" baseline="0" dirty="0" smtClean="0"/>
+              <a:t>instance </a:t>
+            </a:r>
+            <a:r>
+              <a:rPr lang="en-US" altLang="ko-KR" baseline="0" dirty="0" err="1" smtClean="0"/>
+              <a:t>chatbots</a:t>
+            </a:r>
+            <a:r>
+              <a:rPr lang="en-US" altLang="ko-KR" baseline="0" dirty="0" smtClean="0"/>
+              <a:t> </a:t>
+            </a:r>
+            <a:r>
+              <a:rPr lang="en-US" altLang="ko-KR" baseline="0" dirty="0" smtClean="0"/>
+              <a:t>have to answer similarly for inputs having similar meaning. </a:t>
+            </a:r>
+            <a:endParaRPr lang="en-US" altLang="ko-KR" baseline="0" dirty="0" smtClean="0"/>
+          </a:p>
+          <a:p>
+            <a:r>
+              <a:rPr lang="en-US" altLang="ko-KR" baseline="0" dirty="0" smtClean="0"/>
+              <a:t>Even </a:t>
+            </a:r>
+            <a:r>
+              <a:rPr lang="en-US" altLang="ko-KR" baseline="0" dirty="0" smtClean="0"/>
+              <a:t>if we enter exchange rate of 100 dollars rather than the exchange of 100 dollars on the bank clerk, we want to get the amount of Korean won corresponding to 100 dollar. </a:t>
+            </a:r>
+            <a:endParaRPr lang="en-US" altLang="ko-KR" baseline="0" dirty="0" smtClean="0"/>
+          </a:p>
+          <a:p>
+            <a:r>
+              <a:rPr lang="en-US" altLang="ko-KR" baseline="0" dirty="0" smtClean="0"/>
+              <a:t>Sometimes</a:t>
+            </a:r>
+            <a:r>
+              <a:rPr lang="en-US" altLang="ko-KR" baseline="0" dirty="0" smtClean="0"/>
+              <a:t>, we may enter a not-completed sentences, typos, or even abbreviations for the </a:t>
             </a:r>
             <a:r>
               <a:rPr lang="en-US" altLang="ko-KR" baseline="0" dirty="0" err="1" smtClean="0"/>
@@ -877,15 +939,17 @@
             </a:r>
             <a:r>
               <a:rPr lang="en-US" altLang="ko-KR" baseline="0" dirty="0" smtClean="0"/>
-              <a:t>. If </a:t>
-            </a:r>
-            <a:r>
-              <a:rPr lang="en-US" altLang="ko-KR" baseline="0" dirty="0" err="1" smtClean="0"/>
-              <a:t>chatbot</a:t>
-            </a:r>
+              <a:t>, but still want to get a right answer. </a:t>
+            </a:r>
+          </a:p>
+          <a:p>
             <a:r>
               <a:rPr lang="en-US" altLang="ko-KR" baseline="0" dirty="0" smtClean="0"/>
-              <a:t> can understand what it means, then it can still answer. But, many </a:t>
+              <a:t>However, </a:t>
+            </a:r>
+            <a:r>
+              <a:rPr lang="en-US" altLang="ko-KR" baseline="0" dirty="0" smtClean="0"/>
+              <a:t>many </a:t>
             </a:r>
             <a:r>
               <a:rPr lang="en-US" altLang="ko-KR" baseline="0" dirty="0" err="1" smtClean="0"/>
@@ -893,31 +957,17 @@
             </a:r>
             <a:r>
               <a:rPr lang="en-US" altLang="ko-KR" baseline="0" dirty="0" smtClean="0"/>
-              <a:t> cannot do that. I entered 100 dollar</a:t>
-            </a:r>
-            <a:r>
-              <a:rPr lang="ko-KR" altLang="en-US" baseline="0" dirty="0" smtClean="0"/>
               <a:t> </a:t>
             </a:r>
             <a:r>
               <a:rPr lang="en-US" altLang="ko-KR" baseline="0" dirty="0" smtClean="0"/>
-              <a:t>exchange</a:t>
-            </a:r>
-            <a:r>
-              <a:rPr lang="ko-KR" altLang="en-US" baseline="0" dirty="0" smtClean="0"/>
-              <a:t> </a:t>
-            </a:r>
+              <a:t>don’t have that properties. </a:t>
+            </a:r>
+          </a:p>
+          <a:p>
             <a:r>
               <a:rPr lang="en-US" altLang="ko-KR" baseline="0" dirty="0" smtClean="0"/>
-              <a:t>on</a:t>
-            </a:r>
-            <a:r>
-              <a:rPr lang="ko-KR" altLang="en-US" baseline="0" dirty="0" smtClean="0"/>
-              <a:t> </a:t>
-            </a:r>
-            <a:r>
-              <a:rPr lang="en-US" altLang="ko-KR" baseline="0" dirty="0" smtClean="0"/>
-              <a:t>the bank clerk, and it returned the proper result. After that, when I entered 100 dollar exchange rate, it suddenly didn’t understand.</a:t>
+              <a:t>In this example, I succeeded to ask exchange, but failed to ask exchange rate on this clerk.</a:t>
             </a:r>
             <a:endParaRPr lang="ko-KR" altLang="en-US" dirty="0"/>
           </a:p>
@@ -1009,7 +1059,57 @@
             </a:r>
             <a:r>
               <a:rPr lang="en-US" altLang="ko-KR" baseline="0" dirty="0" smtClean="0"/>
-              <a:t> the matter of context, we sometimes omit some parts of the sentence when we talk to each other. So I entered US dollar exchange, and then entered what about china. Then the bank clerk just forgot the context of the dialog and suggested some alternatives. This clerk also failed to recognize similar usage. After I entered dollar exchange rate, I entered 100 dollar exchange rate. Then the clerk said, follow the form of the input to exchange. It is just a rule-based answer, so it means that this </a:t>
+              <a:t> the matter of context, we sometimes omit some parts of the sentence when we talk to each other. </a:t>
+            </a:r>
+            <a:endParaRPr lang="en-US" altLang="ko-KR" baseline="0" dirty="0" smtClean="0"/>
+          </a:p>
+          <a:p>
+            <a:r>
+              <a:rPr lang="en-US" altLang="ko-KR" baseline="0" dirty="0" smtClean="0"/>
+              <a:t>In the left example, you can see that the clerk didn’t reply according to the context.</a:t>
+            </a:r>
+          </a:p>
+          <a:p>
+            <a:r>
+              <a:rPr lang="en-US" altLang="ko-KR" baseline="0" dirty="0" smtClean="0"/>
+              <a:t>This </a:t>
+            </a:r>
+            <a:r>
+              <a:rPr lang="en-US" altLang="ko-KR" baseline="0" dirty="0" smtClean="0"/>
+              <a:t>clerk also failed to recognize similar usage. </a:t>
+            </a:r>
+            <a:endParaRPr lang="en-US" altLang="ko-KR" baseline="0" dirty="0" smtClean="0"/>
+          </a:p>
+          <a:p>
+            <a:r>
+              <a:rPr lang="en-US" altLang="ko-KR" baseline="0" dirty="0" smtClean="0"/>
+              <a:t>When I just added 100 </a:t>
+            </a:r>
+            <a:r>
+              <a:rPr lang="en-US" altLang="ko-KR" sz="1200" kern="1200" dirty="0" smtClean="0">
+                <a:solidFill>
+                  <a:schemeClr val="tx1"/>
+                </a:solidFill>
+                <a:effectLst/>
+                <a:latin typeface="+mn-lt"/>
+                <a:ea typeface="+mn-ea"/>
+                <a:cs typeface="+mn-cs"/>
+              </a:rPr>
+              <a:t>on my text</a:t>
+            </a:r>
+            <a:r>
+              <a:rPr lang="en-US" altLang="ko-KR" baseline="0" dirty="0" smtClean="0"/>
+              <a:t>, the clerk replied to make me follow the form of the input to exchange.</a:t>
+            </a:r>
+          </a:p>
+          <a:p>
+            <a:r>
+              <a:rPr lang="en-US" altLang="ko-KR" baseline="0" dirty="0" smtClean="0"/>
+              <a:t>It </a:t>
+            </a:r>
+            <a:r>
+              <a:rPr lang="en-US" altLang="ko-KR" baseline="0" dirty="0" smtClean="0"/>
+              <a:t>is just a rule-based answer, so it means that this </a:t>
             </a:r>
             <a:r>
               <a:rPr lang="en-US" altLang="ko-KR" baseline="0" dirty="0" err="1" smtClean="0"/>
@@ -1117,7 +1217,37 @@
             </a:r>
             <a:r>
               <a:rPr lang="en-US" altLang="ko-KR" baseline="0" dirty="0" smtClean="0"/>
-              <a:t> two-person conversation with wrong grammar, typos, and even needless emoji. Additionally, we took care about expertized terminology from task-specific domain. What we want to do is let the </a:t>
+              <a:t> two-person </a:t>
+            </a:r>
+            <a:r>
+              <a:rPr lang="en-US" altLang="ko-KR" baseline="0" dirty="0" smtClean="0"/>
+              <a:t>goal-oriented conversation </a:t>
+            </a:r>
+            <a:r>
+              <a:rPr lang="en-US" altLang="ko-KR" baseline="0" dirty="0" smtClean="0"/>
+              <a:t>with wrong grammar, typos, and even needless emoji. </a:t>
+            </a:r>
+            <a:endParaRPr lang="en-US" altLang="ko-KR" baseline="0" dirty="0" smtClean="0"/>
+          </a:p>
+          <a:p>
+            <a:r>
+              <a:rPr lang="en-US" altLang="ko-KR" baseline="0" dirty="0" smtClean="0"/>
+              <a:t>Additionally</a:t>
+            </a:r>
+            <a:r>
+              <a:rPr lang="en-US" altLang="ko-KR" baseline="0" dirty="0" smtClean="0"/>
+              <a:t>, we took care about expertized terminology from task-specific domain. </a:t>
+            </a:r>
+            <a:endParaRPr lang="en-US" altLang="ko-KR" baseline="0" dirty="0" smtClean="0"/>
+          </a:p>
+          <a:p>
+            <a:r>
+              <a:rPr lang="en-US" altLang="ko-KR" baseline="0" dirty="0" smtClean="0"/>
+              <a:t>What </a:t>
+            </a:r>
+            <a:r>
+              <a:rPr lang="en-US" altLang="ko-KR" baseline="0" dirty="0" smtClean="0"/>
+              <a:t>we want to do is let the </a:t>
             </a:r>
             <a:r>
               <a:rPr lang="en-US" altLang="ko-KR" baseline="0" dirty="0" err="1" smtClean="0"/>
@@ -1125,7 +1255,37 @@
             </a:r>
             <a:r>
               <a:rPr lang="en-US" altLang="ko-KR" baseline="0" dirty="0" smtClean="0"/>
-              <a:t> selects the right reaction from the answer pool.</a:t>
+              <a:t> selects the right reaction from the answer pool</a:t>
+            </a:r>
+            <a:r>
+              <a:rPr lang="en-US" altLang="ko-KR" baseline="0" dirty="0" smtClean="0"/>
+              <a:t>.</a:t>
+            </a:r>
+          </a:p>
+          <a:p>
+            <a:r>
+              <a:rPr lang="en-US" altLang="ko-KR" dirty="0" smtClean="0"/>
+              <a:t>We originally planned to generation problem, but we turned it into the selection problem.</a:t>
+            </a:r>
+          </a:p>
+          <a:p>
+            <a:r>
+              <a:rPr lang="en-US" altLang="ko-KR" baseline="0" dirty="0" smtClean="0"/>
+              <a:t>Generation task has too wide possible response pool which makes us not to expect a proper response in most cases.</a:t>
+            </a:r>
+          </a:p>
+          <a:p>
+            <a:r>
+              <a:rPr lang="en-US" altLang="ko-KR" baseline="0" dirty="0" smtClean="0"/>
+              <a:t>However, selection task provides the response set, which makes </a:t>
+            </a:r>
+            <a:r>
+              <a:rPr lang="en-US" altLang="ko-KR" baseline="0" dirty="0" err="1" smtClean="0"/>
+              <a:t>chatbot</a:t>
+            </a:r>
+            <a:r>
+              <a:rPr lang="en-US" altLang="ko-KR" baseline="0" dirty="0" smtClean="0"/>
+              <a:t> to find the more accurate response.</a:t>
             </a:r>
             <a:endParaRPr lang="ko-KR" altLang="en-US" dirty="0"/>
           </a:p>
@@ -1213,17 +1373,50 @@
           <a:p>
             <a:r>
               <a:rPr lang="en-US" altLang="ko-KR" dirty="0" smtClean="0"/>
-              <a:t>For this purpose, we decided to use Ubuntu dialogue corpus. This dataset is the collection of logs from Ubuntu-related chat rooms. The goal of each</a:t>
+              <a:t>For this purpose, we decided to use Ubuntu dialogue corpus. </a:t>
+            </a:r>
+            <a:endParaRPr lang="en-US" altLang="ko-KR" dirty="0" smtClean="0"/>
+          </a:p>
+          <a:p>
+            <a:r>
+              <a:rPr lang="en-US" altLang="ko-KR" dirty="0" smtClean="0"/>
+              <a:t>This </a:t>
+            </a:r>
+            <a:r>
+              <a:rPr lang="en-US" altLang="ko-KR" dirty="0" smtClean="0"/>
+              <a:t>dataset is the collection of logs from Ubuntu-related chat rooms. The goal of each</a:t>
             </a:r>
             <a:r>
               <a:rPr lang="en-US" altLang="ko-KR" baseline="0" dirty="0" smtClean="0"/>
-              <a:t> data is to solve an Ubuntu user’s posted problem from the two-person dialogue.</a:t>
-            </a:r>
-          </a:p>
-          <a:p>
+              <a:t> data is to solve an Ubuntu user’s posted problem from the two-person dialogue</a:t>
+            </a:r>
             <a:r>
               <a:rPr lang="en-US" altLang="ko-KR" baseline="0" dirty="0" smtClean="0"/>
-              <a:t>Here is the formal detail. The given task is to select the next utterance from given candidate set with one </a:t>
+              <a:t>.</a:t>
+            </a:r>
+          </a:p>
+          <a:p>
+            <a:r>
+              <a:rPr lang="en-US" altLang="ko-KR" baseline="0" dirty="0" smtClean="0"/>
+              <a:t>Since our target is to implement response sentence selection model for goal-oriented conversation, we selected this dataset.</a:t>
+            </a:r>
+            <a:endParaRPr lang="en-US" altLang="ko-KR" baseline="0" dirty="0" smtClean="0"/>
+          </a:p>
+          <a:p>
+            <a:r>
+              <a:rPr lang="en-US" altLang="ko-KR" baseline="0" dirty="0" smtClean="0"/>
+              <a:t>Here is the formal detail. </a:t>
+            </a:r>
+            <a:endParaRPr lang="en-US" altLang="ko-KR" baseline="0" dirty="0" smtClean="0"/>
+          </a:p>
+          <a:p>
+            <a:r>
+              <a:rPr lang="en-US" altLang="ko-KR" baseline="0" dirty="0" smtClean="0"/>
+              <a:t>The </a:t>
+            </a:r>
+            <a:r>
+              <a:rPr lang="en-US" altLang="ko-KR" baseline="0" dirty="0" smtClean="0"/>
+              <a:t>given task is to select the next utterance from given candidate set with one </a:t>
             </a:r>
             <a:r>
               <a:rPr lang="en-US" altLang="ko-KR" baseline="0" dirty="0" err="1" smtClean="0"/>
@@ -1231,7 +1424,29 @@
             </a:r>
             <a:r>
               <a:rPr lang="en-US" altLang="ko-KR" baseline="0" dirty="0" smtClean="0"/>
-              <a:t> of sentences, where the only one of them is the correct answer. The performance of the </a:t>
+              <a:t> of sentences, </a:t>
+            </a:r>
+            <a:endParaRPr lang="en-US" altLang="ko-KR" baseline="0" dirty="0" smtClean="0"/>
+          </a:p>
+          <a:p>
+            <a:r>
+              <a:rPr lang="en-US" altLang="ko-KR" baseline="0" dirty="0" smtClean="0"/>
+              <a:t>where </a:t>
+            </a:r>
+            <a:r>
+              <a:rPr lang="en-US" altLang="ko-KR" baseline="0" dirty="0" smtClean="0"/>
+              <a:t>the only one of them is the correct answer. </a:t>
+            </a:r>
+            <a:endParaRPr lang="en-US" altLang="ko-KR" baseline="0" dirty="0" smtClean="0"/>
+          </a:p>
+          <a:p>
+            <a:r>
+              <a:rPr lang="en-US" altLang="ko-KR" baseline="0" dirty="0" smtClean="0"/>
+              <a:t>The </a:t>
+            </a:r>
+            <a:r>
+              <a:rPr lang="en-US" altLang="ko-KR" baseline="0" dirty="0" smtClean="0"/>
+              <a:t>performance of the </a:t>
             </a:r>
             <a:r>
               <a:rPr lang="en-US" altLang="ko-KR" baseline="0" dirty="0" err="1" smtClean="0"/>
@@ -1239,7 +1454,18 @@
             </a:r>
             <a:r>
               <a:rPr lang="en-US" altLang="ko-KR" baseline="0" dirty="0" smtClean="0"/>
-              <a:t> will be decided by the accuracy of the results from Top n in 100. For instance, Top 1 accuracy measures the number of right </a:t>
+              <a:t> will be decided by the accuracy of the results from Top n in 100. </a:t>
+            </a:r>
+            <a:endParaRPr lang="en-US" altLang="ko-KR" baseline="0" dirty="0" smtClean="0"/>
+          </a:p>
+          <a:p>
+            <a:r>
+              <a:rPr lang="en-US" altLang="ko-KR" baseline="0" dirty="0" smtClean="0"/>
+              <a:t>(For </a:t>
+            </a:r>
+            <a:r>
+              <a:rPr lang="en-US" altLang="ko-KR" baseline="0" dirty="0" smtClean="0"/>
+              <a:t>instance, Top 1 accuracy measures the number of right </a:t>
             </a:r>
             <a:r>
               <a:rPr lang="en-US" altLang="ko-KR" baseline="0" dirty="0" err="1" smtClean="0"/>
@@ -1247,7 +1473,11 @@
             </a:r>
             <a:r>
               <a:rPr lang="en-US" altLang="ko-KR" baseline="0" dirty="0" smtClean="0"/>
-              <a:t> among the whole responses.</a:t>
+              <a:t> among the whole responses</a:t>
+            </a:r>
+            <a:r>
+              <a:rPr lang="en-US" altLang="ko-KR" baseline="0" dirty="0" smtClean="0"/>
+              <a:t>.)</a:t>
             </a:r>
             <a:endParaRPr lang="ko-KR" altLang="en-US" dirty="0"/>
           </a:p>
@@ -1335,11 +1565,11 @@
           <a:p>
             <a:r>
               <a:rPr lang="en-US" altLang="ko-KR" dirty="0" smtClean="0"/>
-              <a:t>Here is an example of the data. In this dialogue, user 1 wants</a:t>
+              <a:t>Here is an example of the dialogue.</a:t>
             </a:r>
             <a:r>
               <a:rPr lang="en-US" altLang="ko-KR" baseline="0" dirty="0" smtClean="0"/>
-              <a:t> to recognize his </a:t>
+              <a:t> In this dialogue, user 1 wants to recognize his </a:t>
             </a:r>
             <a:r>
               <a:rPr lang="en-US" altLang="ko-KR" baseline="0" dirty="0" err="1" smtClean="0"/>
@@ -1347,7 +1577,7 @@
             </a:r>
             <a:r>
               <a:rPr lang="en-US" altLang="ko-KR" baseline="0" dirty="0" smtClean="0"/>
-              <a:t> on the Ubuntu, but the tool called </a:t>
+              <a:t> on the Ubuntu via </a:t>
             </a:r>
             <a:r>
               <a:rPr lang="en-US" altLang="ko-KR" baseline="0" dirty="0" err="1" smtClean="0"/>
@@ -1355,31 +1585,25 @@
             </a:r>
             <a:r>
               <a:rPr lang="en-US" altLang="ko-KR" baseline="0" dirty="0" smtClean="0"/>
-              <a:t> doesn’t recognize it. So he asked that, and user2 suggested </a:t>
-            </a:r>
-            <a:r>
-              <a:rPr lang="en-US" altLang="ko-KR" baseline="0" dirty="0" err="1" smtClean="0"/>
-              <a:t>rhythmbox</a:t>
-            </a:r>
+              <a:t> and write some songs into his device.</a:t>
+            </a:r>
+          </a:p>
+          <a:p>
             <a:r>
               <a:rPr lang="en-US" altLang="ko-KR" baseline="0" dirty="0" smtClean="0"/>
-              <a:t> to read </a:t>
-            </a:r>
-            <a:r>
-              <a:rPr lang="en-US" altLang="ko-KR" baseline="0" dirty="0" err="1" smtClean="0"/>
-              <a:t>ipod</a:t>
-            </a:r>
+              <a:t>The proper answer in this case should be a sentence what user2 experienced on that tool.</a:t>
+            </a:r>
+          </a:p>
+          <a:p>
             <a:r>
               <a:rPr lang="en-US" altLang="ko-KR" baseline="0" dirty="0" smtClean="0"/>
-              <a:t>. Then user1 asked about writing data into the </a:t>
-            </a:r>
-            <a:r>
-              <a:rPr lang="en-US" altLang="ko-KR" baseline="0" dirty="0" err="1" smtClean="0"/>
-              <a:t>ipod</a:t>
-            </a:r>
+              <a:t>In the dialogue, you can see some typos and wrong grammars on the user1.</a:t>
+            </a:r>
+          </a:p>
+          <a:p>
             <a:r>
               <a:rPr lang="en-US" altLang="ko-KR" baseline="0" dirty="0" smtClean="0"/>
-              <a:t>. In this example, the right answer is explaining what user2 experienced. There are some wrong examples, some of which contains simple answer like simple no, or some hesitating answer, and so on. Also you can see some typos and wrong grammars on the user 1.</a:t>
+              <a:t>In the candidate set, there are some possible simple answers like No on number 12, hesitating answer on number 26, and so on.</a:t>
             </a:r>
             <a:endParaRPr lang="ko-KR" altLang="en-US" dirty="0"/>
           </a:p>
@@ -1471,7 +1695,76 @@
             </a:r>
             <a:r>
               <a:rPr lang="en-US" altLang="ko-KR" baseline="0" dirty="0" smtClean="0"/>
-              <a:t> the right result. It takes conversations and responses as a vector of words, and the recurrent neural network captures the meaning of each sentences. Then it predicts the response by taking the matrix multiplication of conversation vector and the trained matrix, and get the dot product with the actual response r. As the dot product gets bigger, the prediction goes similar to the answer. Finally, it converts that value to the probability. Then we sort the probability for each candidates to get the top n answers. Now we will introduce our model.</a:t>
+              <a:t> the right result. </a:t>
+            </a:r>
+            <a:endParaRPr lang="en-US" altLang="ko-KR" baseline="0" dirty="0" smtClean="0"/>
+          </a:p>
+          <a:p>
+            <a:r>
+              <a:rPr lang="en-US" altLang="ko-KR" baseline="0" dirty="0" smtClean="0"/>
+              <a:t>It </a:t>
+            </a:r>
+            <a:r>
+              <a:rPr lang="en-US" altLang="ko-KR" baseline="0" dirty="0" smtClean="0"/>
+              <a:t>takes conversations and responses as a vector of words, and the recurrent neural network captures the meaning of each sentences. </a:t>
+            </a:r>
+            <a:endParaRPr lang="en-US" altLang="ko-KR" baseline="0" dirty="0" smtClean="0"/>
+          </a:p>
+          <a:p>
+            <a:r>
+              <a:rPr lang="en-US" altLang="ko-KR" baseline="0" dirty="0" smtClean="0"/>
+              <a:t>Then </a:t>
+            </a:r>
+            <a:r>
+              <a:rPr lang="en-US" altLang="ko-KR" baseline="0" dirty="0" smtClean="0"/>
+              <a:t>it predicts the response </a:t>
+            </a:r>
+            <a:r>
+              <a:rPr lang="en-US" altLang="ko-KR" baseline="0" dirty="0" smtClean="0"/>
+              <a:t>and compares to the actual response by taking dot product. </a:t>
+            </a:r>
+          </a:p>
+          <a:p>
+            <a:r>
+              <a:rPr lang="en-US" altLang="ko-KR" baseline="0" dirty="0" smtClean="0"/>
+              <a:t>As </a:t>
+            </a:r>
+            <a:r>
+              <a:rPr lang="en-US" altLang="ko-KR" baseline="0" dirty="0" smtClean="0"/>
+              <a:t>the dot product gets bigger, the prediction goes similar to the answer. </a:t>
+            </a:r>
+            <a:endParaRPr lang="en-US" altLang="ko-KR" baseline="0" dirty="0" smtClean="0"/>
+          </a:p>
+          <a:p>
+            <a:r>
+              <a:rPr lang="en-US" altLang="ko-KR" baseline="0" dirty="0" smtClean="0"/>
+              <a:t>Finally</a:t>
+            </a:r>
+            <a:r>
+              <a:rPr lang="en-US" altLang="ko-KR" baseline="0" dirty="0" smtClean="0"/>
+              <a:t>, it converts that value to the probability. </a:t>
+            </a:r>
+            <a:endParaRPr lang="en-US" altLang="ko-KR" baseline="0" dirty="0" smtClean="0"/>
+          </a:p>
+          <a:p>
+            <a:r>
+              <a:rPr lang="en-US" altLang="ko-KR" baseline="0" dirty="0" smtClean="0"/>
+              <a:t>Then it sorts </a:t>
+            </a:r>
+            <a:r>
+              <a:rPr lang="en-US" altLang="ko-KR" baseline="0" dirty="0" smtClean="0"/>
+              <a:t>the probability for each candidates to get the top n answers. </a:t>
+            </a:r>
+            <a:endParaRPr lang="en-US" altLang="ko-KR" baseline="0" dirty="0" smtClean="0"/>
+          </a:p>
+          <a:p>
+            <a:r>
+              <a:rPr lang="en-US" altLang="ko-KR" baseline="0" dirty="0" smtClean="0"/>
+              <a:t>Now </a:t>
+            </a:r>
+            <a:r>
+              <a:rPr lang="en-US" altLang="ko-KR" baseline="0" dirty="0" smtClean="0"/>
+              <a:t>we will introduce our model.</a:t>
             </a:r>
             <a:endParaRPr lang="ko-KR" altLang="en-US" dirty="0"/>
           </a:p>
@@ -1694,7 +1987,7 @@
           <a:p>
             <a:fld id="{8C82C29E-9832-47D5-AF43-442136865ABE}" type="datetimeFigureOut">
               <a:rPr lang="ko-KR" altLang="en-US" smtClean="0"/>
-              <a:t>2018-12-03</a:t>
+              <a:t>2018-12-04</a:t>
             </a:fld>
             <a:endParaRPr lang="ko-KR" altLang="en-US"/>
           </a:p>
@@ -1864,7 +2157,7 @@
           <a:p>
             <a:fld id="{8C82C29E-9832-47D5-AF43-442136865ABE}" type="datetimeFigureOut">
               <a:rPr lang="ko-KR" altLang="en-US" smtClean="0"/>
-              <a:t>2018-12-03</a:t>
+              <a:t>2018-12-04</a:t>
             </a:fld>
             <a:endParaRPr lang="ko-KR" altLang="en-US"/>
           </a:p>
@@ -2044,7 +2337,7 @@
           <a:p>
             <a:fld id="{8C82C29E-9832-47D5-AF43-442136865ABE}" type="datetimeFigureOut">
               <a:rPr lang="ko-KR" altLang="en-US" smtClean="0"/>
-              <a:t>2018-12-03</a:t>
+              <a:t>2018-12-04</a:t>
             </a:fld>
             <a:endParaRPr lang="ko-KR" altLang="en-US"/>
           </a:p>
@@ -2214,7 +2507,7 @@
           <a:p>
             <a:fld id="{8C82C29E-9832-47D5-AF43-442136865ABE}" type="datetimeFigureOut">
               <a:rPr lang="ko-KR" altLang="en-US" smtClean="0"/>
-              <a:t>2018-12-03</a:t>
+              <a:t>2018-12-04</a:t>
             </a:fld>
             <a:endParaRPr lang="ko-KR" altLang="en-US"/>
           </a:p>
@@ -2460,7 +2753,7 @@
           <a:p>
             <a:fld id="{8C82C29E-9832-47D5-AF43-442136865ABE}" type="datetimeFigureOut">
               <a:rPr lang="ko-KR" altLang="en-US" smtClean="0"/>
-              <a:t>2018-12-03</a:t>
+              <a:t>2018-12-04</a:t>
             </a:fld>
             <a:endParaRPr lang="ko-KR" altLang="en-US"/>
           </a:p>
@@ -2748,7 +3041,7 @@
           <a:p>
             <a:fld id="{8C82C29E-9832-47D5-AF43-442136865ABE}" type="datetimeFigureOut">
               <a:rPr lang="ko-KR" altLang="en-US" smtClean="0"/>
-              <a:t>2018-12-03</a:t>
+              <a:t>2018-12-04</a:t>
             </a:fld>
             <a:endParaRPr lang="ko-KR" altLang="en-US"/>
           </a:p>
@@ -3170,7 +3463,7 @@
           <a:p>
             <a:fld id="{8C82C29E-9832-47D5-AF43-442136865ABE}" type="datetimeFigureOut">
               <a:rPr lang="ko-KR" altLang="en-US" smtClean="0"/>
-              <a:t>2018-12-03</a:t>
+              <a:t>2018-12-04</a:t>
             </a:fld>
             <a:endParaRPr lang="ko-KR" altLang="en-US"/>
           </a:p>
@@ -3288,7 +3581,7 @@
           <a:p>
             <a:fld id="{8C82C29E-9832-47D5-AF43-442136865ABE}" type="datetimeFigureOut">
               <a:rPr lang="ko-KR" altLang="en-US" smtClean="0"/>
-              <a:t>2018-12-03</a:t>
+              <a:t>2018-12-04</a:t>
             </a:fld>
             <a:endParaRPr lang="ko-KR" altLang="en-US"/>
           </a:p>
@@ -3383,7 +3676,7 @@
           <a:p>
             <a:fld id="{8C82C29E-9832-47D5-AF43-442136865ABE}" type="datetimeFigureOut">
               <a:rPr lang="ko-KR" altLang="en-US" smtClean="0"/>
-              <a:t>2018-12-03</a:t>
+              <a:t>2018-12-04</a:t>
             </a:fld>
             <a:endParaRPr lang="ko-KR" altLang="en-US"/>
           </a:p>
@@ -3660,7 +3953,7 @@
           <a:p>
             <a:fld id="{8C82C29E-9832-47D5-AF43-442136865ABE}" type="datetimeFigureOut">
               <a:rPr lang="ko-KR" altLang="en-US" smtClean="0"/>
-              <a:t>2018-12-03</a:t>
+              <a:t>2018-12-04</a:t>
             </a:fld>
             <a:endParaRPr lang="ko-KR" altLang="en-US"/>
           </a:p>
@@ -3913,7 +4206,7 @@
           <a:p>
             <a:fld id="{8C82C29E-9832-47D5-AF43-442136865ABE}" type="datetimeFigureOut">
               <a:rPr lang="ko-KR" altLang="en-US" smtClean="0"/>
-              <a:t>2018-12-03</a:t>
+              <a:t>2018-12-04</a:t>
             </a:fld>
             <a:endParaRPr lang="ko-KR" altLang="en-US"/>
           </a:p>
@@ -4126,7 +4419,7 @@
           <a:p>
             <a:fld id="{8C82C29E-9832-47D5-AF43-442136865ABE}" type="datetimeFigureOut">
               <a:rPr lang="ko-KR" altLang="en-US" smtClean="0"/>
-              <a:t>2018-12-03</a:t>
+              <a:t>2018-12-04</a:t>
             </a:fld>
             <a:endParaRPr lang="ko-KR" altLang="en-US"/>
           </a:p>
@@ -5645,7 +5938,7 @@
         <p:spPr>
           <a:xfrm>
             <a:off x="6174268" y="4005064"/>
-            <a:ext cx="2736304" cy="923330"/>
+            <a:ext cx="2736304" cy="646331"/>
           </a:xfrm>
           <a:prstGeom prst="rect">
             <a:avLst/>
@@ -5677,7 +5970,21 @@
                 <a:latin typeface="Cambria Math" panose="02040503050406030204" pitchFamily="18" charset="0"/>
                 <a:ea typeface="Cambria Math" panose="02040503050406030204" pitchFamily="18" charset="0"/>
               </a:rPr>
-              <a:t> cannot recognize neither context nor similar words.</a:t>
+              <a:t> cannot recognize </a:t>
+            </a:r>
+            <a:r>
+              <a:rPr lang="en-US" altLang="ko-KR" dirty="0" smtClean="0">
+                <a:latin typeface="Cambria Math" panose="02040503050406030204" pitchFamily="18" charset="0"/>
+                <a:ea typeface="Cambria Math" panose="02040503050406030204" pitchFamily="18" charset="0"/>
+              </a:rPr>
+              <a:t>similar </a:t>
+            </a:r>
+            <a:r>
+              <a:rPr lang="en-US" altLang="ko-KR" dirty="0" smtClean="0">
+                <a:latin typeface="Cambria Math" panose="02040503050406030204" pitchFamily="18" charset="0"/>
+                <a:ea typeface="Cambria Math" panose="02040503050406030204" pitchFamily="18" charset="0"/>
+              </a:rPr>
+              <a:t>words.</a:t>
             </a:r>
             <a:endParaRPr lang="ko-KR" altLang="en-US" dirty="0">
               <a:latin typeface="Cambria Math" panose="02040503050406030204" pitchFamily="18" charset="0"/>
@@ -6308,7 +6615,7 @@
         <p:spPr>
           <a:xfrm>
             <a:off x="422828" y="1141874"/>
-            <a:ext cx="7822229" cy="2308324"/>
+            <a:ext cx="7822229" cy="4247317"/>
           </a:xfrm>
           <a:prstGeom prst="rect">
             <a:avLst/>
@@ -6363,7 +6670,25 @@
                 </a:solidFill>
                 <a:latin typeface="Cambria Math" panose="02040503050406030204" pitchFamily="18" charset="0"/>
               </a:rPr>
-              <a:t> which recognizes a two-person conversation including </a:t>
+              <a:t> which recognizes a two-person </a:t>
+            </a:r>
+            <a:r>
+              <a:rPr lang="en-US" altLang="ko-KR" dirty="0" smtClean="0">
+                <a:solidFill>
+                  <a:schemeClr val="tx1"/>
+                </a:solidFill>
+                <a:latin typeface="Cambria Math" panose="02040503050406030204" pitchFamily="18" charset="0"/>
+              </a:rPr>
+              <a:t>goal-oriented conversation </a:t>
+            </a:r>
+            <a:r>
+              <a:rPr lang="en-US" altLang="ko-KR" dirty="0" smtClean="0">
+                <a:solidFill>
+                  <a:schemeClr val="tx1"/>
+                </a:solidFill>
+                <a:latin typeface="Cambria Math" panose="02040503050406030204" pitchFamily="18" charset="0"/>
+              </a:rPr>
+              <a:t>including </a:t>
             </a:r>
           </a:p>
           <a:p>
@@ -6443,6 +6768,15 @@
           </a:p>
           <a:p>
             <a:pPr latinLnBrk="0"/>
+            <a:endParaRPr lang="en-US" altLang="ko-KR" dirty="0" smtClean="0">
+              <a:solidFill>
+                <a:schemeClr val="tx1"/>
+              </a:solidFill>
+              <a:latin typeface="Cambria Math" panose="02040503050406030204" pitchFamily="18" charset="0"/>
+            </a:endParaRPr>
+          </a:p>
+          <a:p>
+            <a:pPr latinLnBrk="0"/>
             <a:r>
               <a:rPr lang="en-US" altLang="ko-KR" dirty="0" smtClean="0">
                 <a:solidFill>
@@ -6471,8 +6805,92 @@
                 </a:solidFill>
                 <a:latin typeface="Cambria Math" panose="02040503050406030204" pitchFamily="18" charset="0"/>
               </a:rPr>
-              <a:t>hich should not be hand-crafted, rule-based systems or based on hand-crafted features</a:t>
-            </a:r>
+              <a:t>hich should not be hand-crafted, rule-based systems or based on hand-crafted </a:t>
+            </a:r>
+            <a:r>
+              <a:rPr lang="en-US" altLang="ko-KR" dirty="0" smtClean="0">
+                <a:solidFill>
+                  <a:schemeClr val="tx1"/>
+                </a:solidFill>
+                <a:latin typeface="Cambria Math" panose="02040503050406030204" pitchFamily="18" charset="0"/>
+              </a:rPr>
+              <a:t>features</a:t>
+            </a:r>
+          </a:p>
+          <a:p>
+            <a:pPr latinLnBrk="0"/>
+            <a:endParaRPr lang="en-US" altLang="ko-KR" dirty="0">
+              <a:solidFill>
+                <a:schemeClr val="tx1"/>
+              </a:solidFill>
+              <a:latin typeface="Cambria Math" panose="02040503050406030204" pitchFamily="18" charset="0"/>
+            </a:endParaRPr>
+          </a:p>
+          <a:p>
+            <a:pPr latinLnBrk="0"/>
+            <a:r>
+              <a:rPr lang="en-US" altLang="ko-KR" dirty="0" smtClean="0">
+                <a:solidFill>
+                  <a:schemeClr val="tx1"/>
+                </a:solidFill>
+                <a:latin typeface="Cambria Math" panose="02040503050406030204" pitchFamily="18" charset="0"/>
+              </a:rPr>
+              <a:t>Generation task: too wide possible response pool, cannot expect a proper response in most cases</a:t>
+            </a:r>
+          </a:p>
+          <a:p>
+            <a:pPr latinLnBrk="0"/>
+            <a:r>
+              <a:rPr lang="en-US" altLang="ko-KR" dirty="0" smtClean="0">
+                <a:solidFill>
+                  <a:schemeClr val="tx1"/>
+                </a:solidFill>
+                <a:latin typeface="Cambria Math" panose="02040503050406030204" pitchFamily="18" charset="0"/>
+              </a:rPr>
+              <a:t>Selection task: provide a limited response pool, makes </a:t>
+            </a:r>
+            <a:r>
+              <a:rPr lang="en-US" altLang="ko-KR" dirty="0" err="1" smtClean="0">
+                <a:solidFill>
+                  <a:schemeClr val="tx1"/>
+                </a:solidFill>
+                <a:latin typeface="Cambria Math" panose="02040503050406030204" pitchFamily="18" charset="0"/>
+              </a:rPr>
+              <a:t>chatbot</a:t>
+            </a:r>
+            <a:r>
+              <a:rPr lang="en-US" altLang="ko-KR" dirty="0" smtClean="0">
+                <a:solidFill>
+                  <a:schemeClr val="tx1"/>
+                </a:solidFill>
+                <a:latin typeface="Cambria Math" panose="02040503050406030204" pitchFamily="18" charset="0"/>
+              </a:rPr>
+              <a:t> to find the more </a:t>
+            </a:r>
+            <a:r>
+              <a:rPr lang="en-US" altLang="ko-KR" dirty="0" err="1" smtClean="0">
+                <a:solidFill>
+                  <a:schemeClr val="tx1"/>
+                </a:solidFill>
+                <a:latin typeface="Cambria Math" panose="02040503050406030204" pitchFamily="18" charset="0"/>
+              </a:rPr>
+              <a:t>accuract</a:t>
+            </a:r>
+            <a:r>
+              <a:rPr lang="en-US" altLang="ko-KR" dirty="0" smtClean="0">
+                <a:solidFill>
+                  <a:schemeClr val="tx1"/>
+                </a:solidFill>
+                <a:latin typeface="Cambria Math" panose="02040503050406030204" pitchFamily="18" charset="0"/>
+              </a:rPr>
+              <a:t> response</a:t>
+            </a:r>
+            <a:endParaRPr lang="en-US" altLang="ko-KR" dirty="0" smtClean="0">
+              <a:solidFill>
+                <a:schemeClr val="tx1"/>
+              </a:solidFill>
+              <a:latin typeface="Cambria Math" panose="02040503050406030204" pitchFamily="18" charset="0"/>
+            </a:endParaRPr>
           </a:p>
         </p:txBody>
       </p:sp>
@@ -6601,7 +7019,7 @@
         <p:spPr>
           <a:xfrm>
             <a:off x="422828" y="1141874"/>
-            <a:ext cx="7822229" cy="3416320"/>
+            <a:ext cx="7822229" cy="3970318"/>
           </a:xfrm>
           <a:prstGeom prst="rect">
             <a:avLst/>
@@ -6694,6 +7112,36 @@
               </a:rPr>
               <a:t>problem</a:t>
             </a:r>
+          </a:p>
+          <a:p>
+            <a:pPr marL="285750" indent="-285750" latinLnBrk="0">
+              <a:buFontTx/>
+              <a:buChar char="-"/>
+            </a:pPr>
+            <a:r>
+              <a:rPr lang="en-US" altLang="ko-KR" dirty="0">
+                <a:solidFill>
+                  <a:schemeClr val="tx1"/>
+                </a:solidFill>
+                <a:latin typeface="Cambria Math" panose="02040503050406030204" pitchFamily="18" charset="0"/>
+              </a:rPr>
+              <a:t>a</a:t>
+            </a:r>
+            <a:r>
+              <a:rPr lang="en-US" altLang="ko-KR" dirty="0" smtClean="0">
+                <a:solidFill>
+                  <a:schemeClr val="tx1"/>
+                </a:solidFill>
+                <a:latin typeface="Cambria Math" panose="02040503050406030204" pitchFamily="18" charset="0"/>
+              </a:rPr>
+              <a:t>ppropriate dataset to construct response sentence selection model for goal-oriented conversation (like bank clerks)</a:t>
+            </a:r>
+            <a:endParaRPr lang="en-US" altLang="ko-KR" dirty="0" smtClean="0">
+              <a:solidFill>
+                <a:schemeClr val="tx1"/>
+              </a:solidFill>
+              <a:latin typeface="Cambria Math" panose="02040503050406030204" pitchFamily="18" charset="0"/>
+            </a:endParaRPr>
           </a:p>
           <a:p>
             <a:pPr latinLnBrk="0"/>

</xml_diff>